<commit_message>
Updated course admin slides
</commit_message>
<xml_diff>
--- a/lectures/CourseAdmin.pptx
+++ b/lectures/CourseAdmin.pptx
@@ -5,7 +5,7 @@
     <p:sldMasterId id="2147483648" r:id="rId1"/>
   </p:sldMasterIdLst>
   <p:notesMasterIdLst>
-    <p:notesMasterId r:id="rId17"/>
+    <p:notesMasterId r:id="rId20"/>
   </p:notesMasterIdLst>
   <p:sldIdLst>
     <p:sldId id="258" r:id="rId2"/>
@@ -23,6 +23,9 @@
     <p:sldId id="406" r:id="rId14"/>
     <p:sldId id="419" r:id="rId15"/>
     <p:sldId id="400" r:id="rId16"/>
+    <p:sldId id="802" r:id="rId17"/>
+    <p:sldId id="272" r:id="rId18"/>
+    <p:sldId id="411" r:id="rId19"/>
   </p:sldIdLst>
   <p:sldSz cx="12192000" cy="6858000"/>
   <p:notesSz cx="7315200" cy="9601200"/>
@@ -222,7 +225,7 @@
           <a:p>
             <a:fld id="{B7D6DDD3-D7E9-488B-B626-1E8285E424D8}" type="datetimeFigureOut">
               <a:rPr lang="en-US" smtClean="0"/>
-              <a:t>1/11/2021</a:t>
+              <a:t>2/1/2021</a:t>
             </a:fld>
             <a:endParaRPr lang="en-US"/>
           </a:p>
@@ -7588,14 +7591,21 @@
             <a:pPr lvl="1"/>
             <a:r>
               <a:rPr lang="en-US" dirty="0"/>
-              <a:t>40% homework and labs </a:t>
+              <a:t>25% Homework (including MATLAB exercises)</a:t>
             </a:r>
           </a:p>
           <a:p>
             <a:pPr lvl="1"/>
             <a:r>
               <a:rPr lang="en-US" dirty="0"/>
-              <a:t>30% midterm, 30% final</a:t>
+              <a:t>25% Midterm 1, 25% Midterm 2</a:t>
+            </a:r>
+          </a:p>
+          <a:p>
+            <a:pPr lvl="1"/>
+            <a:r>
+              <a:rPr lang="en-US" dirty="0"/>
+              <a:t>25% Project</a:t>
             </a:r>
           </a:p>
           <a:p>
@@ -7604,7 +7614,14 @@
           <a:p>
             <a:r>
               <a:rPr lang="en-US" dirty="0"/>
-              <a:t>Exams:  Midterm and final will be given remotely</a:t>
+              <a:t>Exams:  Midterms will be given remotely</a:t>
+            </a:r>
+          </a:p>
+          <a:p>
+            <a:pPr lvl="1"/>
+            <a:r>
+              <a:rPr lang="en-US" dirty="0"/>
+              <a:t>Take home.  Approximately one day to complete.</a:t>
             </a:r>
           </a:p>
           <a:p>
@@ -7633,6 +7650,723 @@
     <p:extLst>
       <p:ext uri="{BB962C8B-B14F-4D97-AF65-F5344CB8AC3E}">
         <p14:creationId xmlns:p14="http://schemas.microsoft.com/office/powerpoint/2010/main" val="2730640790"/>
+      </p:ext>
+    </p:extLst>
+  </p:cSld>
+  <p:clrMapOvr>
+    <a:masterClrMapping/>
+  </p:clrMapOvr>
+</p:sld>
+</file>
+
+<file path=ppt/slides/slide16.xml><?xml version="1.0" encoding="utf-8"?>
+<p:sld xmlns:a="http://schemas.openxmlformats.org/drawingml/2006/main" xmlns:r="http://schemas.openxmlformats.org/officeDocument/2006/relationships" xmlns:p="http://schemas.openxmlformats.org/presentationml/2006/main">
+  <p:cSld>
+    <p:spTree>
+      <p:nvGrpSpPr>
+        <p:cNvPr id="1" name=""/>
+        <p:cNvGrpSpPr/>
+        <p:nvPr/>
+      </p:nvGrpSpPr>
+      <p:grpSpPr>
+        <a:xfrm>
+          <a:off x="0" y="0"/>
+          <a:ext cx="0" cy="0"/>
+          <a:chOff x="0" y="0"/>
+          <a:chExt cx="0" cy="0"/>
+        </a:xfrm>
+      </p:grpSpPr>
+      <p:sp>
+        <p:nvSpPr>
+          <p:cNvPr id="2" name="Title 1">
+            <a:extLst>
+              <a:ext uri="{FF2B5EF4-FFF2-40B4-BE49-F238E27FC236}">
+                <a16:creationId xmlns:a16="http://schemas.microsoft.com/office/drawing/2014/main" id="{6CF69187-A211-48E8-9B5C-1573F34AC415}"/>
+              </a:ext>
+            </a:extLst>
+          </p:cNvPr>
+          <p:cNvSpPr>
+            <a:spLocks noGrp="1"/>
+          </p:cNvSpPr>
+          <p:nvPr>
+            <p:ph type="title"/>
+          </p:nvPr>
+        </p:nvSpPr>
+        <p:spPr/>
+        <p:txBody>
+          <a:bodyPr/>
+          <a:lstStyle/>
+          <a:p>
+            <a:r>
+              <a:rPr lang="en-US" dirty="0"/>
+              <a:t>Project</a:t>
+            </a:r>
+          </a:p>
+        </p:txBody>
+      </p:sp>
+      <p:sp>
+        <p:nvSpPr>
+          <p:cNvPr id="3" name="Content Placeholder 2">
+            <a:extLst>
+              <a:ext uri="{FF2B5EF4-FFF2-40B4-BE49-F238E27FC236}">
+                <a16:creationId xmlns:a16="http://schemas.microsoft.com/office/drawing/2014/main" id="{1E232070-77DB-460F-A8B8-8DA935A0D887}"/>
+              </a:ext>
+            </a:extLst>
+          </p:cNvPr>
+          <p:cNvSpPr>
+            <a:spLocks noGrp="1"/>
+          </p:cNvSpPr>
+          <p:nvPr>
+            <p:ph idx="1"/>
+          </p:nvPr>
+        </p:nvSpPr>
+        <p:spPr/>
+        <p:txBody>
+          <a:bodyPr>
+            <a:normAutofit/>
+          </a:bodyPr>
+          <a:lstStyle/>
+          <a:p>
+            <a:r>
+              <a:rPr lang="en-US" dirty="0"/>
+              <a:t>Groups of two</a:t>
+            </a:r>
+          </a:p>
+          <a:p>
+            <a:r>
+              <a:rPr lang="en-US" dirty="0"/>
+              <a:t>Any topic of your interest in the area of wireless</a:t>
+            </a:r>
+          </a:p>
+          <a:p>
+            <a:r>
+              <a:rPr lang="en-US" dirty="0"/>
+              <a:t>Example:</a:t>
+            </a:r>
+          </a:p>
+          <a:p>
+            <a:pPr lvl="1"/>
+            <a:r>
+              <a:rPr lang="en-US" dirty="0"/>
+              <a:t>802.11ad, LTE, 5G, …</a:t>
+            </a:r>
+          </a:p>
+          <a:p>
+            <a:r>
+              <a:rPr lang="en-US" dirty="0"/>
+              <a:t>Does not need to be original research.  </a:t>
+            </a:r>
+          </a:p>
+          <a:p>
+            <a:pPr lvl="1"/>
+            <a:r>
+              <a:rPr lang="en-US" dirty="0"/>
+              <a:t>Can be a solid implementation of something standard with a comprehensive evaluation.</a:t>
+            </a:r>
+          </a:p>
+          <a:p>
+            <a:r>
+              <a:rPr lang="en-US" dirty="0"/>
+              <a:t>Should involve some extensive simulation</a:t>
+            </a:r>
+          </a:p>
+          <a:p>
+            <a:pPr lvl="1"/>
+            <a:r>
+              <a:rPr lang="en-US" dirty="0"/>
+              <a:t>You need a comprehensive simulation of at least one component</a:t>
+            </a:r>
+          </a:p>
+          <a:p>
+            <a:pPr lvl="1"/>
+            <a:r>
+              <a:rPr lang="en-US" dirty="0"/>
+              <a:t>Better yet, some experimental component</a:t>
+            </a:r>
+          </a:p>
+          <a:p>
+            <a:pPr lvl="1"/>
+            <a:r>
+              <a:rPr lang="en-US" dirty="0"/>
+              <a:t>Code will be graded for quality</a:t>
+            </a:r>
+          </a:p>
+          <a:p>
+            <a:r>
+              <a:rPr lang="en-US" dirty="0"/>
+              <a:t>Will give presentation in  final lecture</a:t>
+            </a:r>
+          </a:p>
+        </p:txBody>
+      </p:sp>
+      <p:sp>
+        <p:nvSpPr>
+          <p:cNvPr id="4" name="Slide Number Placeholder 3">
+            <a:extLst>
+              <a:ext uri="{FF2B5EF4-FFF2-40B4-BE49-F238E27FC236}">
+                <a16:creationId xmlns:a16="http://schemas.microsoft.com/office/drawing/2014/main" id="{C9BC629F-AFA4-4777-93DC-67F2D108FADF}"/>
+              </a:ext>
+            </a:extLst>
+          </p:cNvPr>
+          <p:cNvSpPr>
+            <a:spLocks noGrp="1"/>
+          </p:cNvSpPr>
+          <p:nvPr>
+            <p:ph type="sldNum" sz="quarter" idx="12"/>
+          </p:nvPr>
+        </p:nvSpPr>
+        <p:spPr/>
+        <p:txBody>
+          <a:bodyPr/>
+          <a:lstStyle/>
+          <a:p>
+            <a:fld id="{629637A9-119A-49DA-BD12-AAC58B377D80}" type="slidenum">
+              <a:rPr lang="en-US" smtClean="0"/>
+              <a:t>16</a:t>
+            </a:fld>
+            <a:endParaRPr lang="en-US" dirty="0"/>
+          </a:p>
+        </p:txBody>
+      </p:sp>
+    </p:spTree>
+    <p:extLst>
+      <p:ext uri="{BB962C8B-B14F-4D97-AF65-F5344CB8AC3E}">
+        <p14:creationId xmlns:p14="http://schemas.microsoft.com/office/powerpoint/2010/main" val="2131691655"/>
+      </p:ext>
+    </p:extLst>
+  </p:cSld>
+  <p:clrMapOvr>
+    <a:masterClrMapping/>
+  </p:clrMapOvr>
+</p:sld>
+</file>
+
+<file path=ppt/slides/slide17.xml><?xml version="1.0" encoding="utf-8"?>
+<p:sld xmlns:a="http://schemas.openxmlformats.org/drawingml/2006/main" xmlns:r="http://schemas.openxmlformats.org/officeDocument/2006/relationships" xmlns:p="http://schemas.openxmlformats.org/presentationml/2006/main">
+  <p:cSld>
+    <p:spTree>
+      <p:nvGrpSpPr>
+        <p:cNvPr id="1" name=""/>
+        <p:cNvGrpSpPr/>
+        <p:nvPr/>
+      </p:nvGrpSpPr>
+      <p:grpSpPr>
+        <a:xfrm>
+          <a:off x="0" y="0"/>
+          <a:ext cx="0" cy="0"/>
+          <a:chOff x="0" y="0"/>
+          <a:chExt cx="0" cy="0"/>
+        </a:xfrm>
+      </p:grpSpPr>
+      <p:sp>
+        <p:nvSpPr>
+          <p:cNvPr id="2" name="Title 1">
+            <a:extLst>
+              <a:ext uri="{FF2B5EF4-FFF2-40B4-BE49-F238E27FC236}">
+                <a16:creationId xmlns:a16="http://schemas.microsoft.com/office/drawing/2014/main" id="{08A83E15-2151-47C0-9EF1-ADA322027CCE}"/>
+              </a:ext>
+            </a:extLst>
+          </p:cNvPr>
+          <p:cNvSpPr>
+            <a:spLocks noGrp="1"/>
+          </p:cNvSpPr>
+          <p:nvPr>
+            <p:ph type="title"/>
+          </p:nvPr>
+        </p:nvSpPr>
+        <p:spPr/>
+        <p:txBody>
+          <a:bodyPr/>
+          <a:lstStyle/>
+          <a:p>
+            <a:r>
+              <a:rPr lang="en-US" dirty="0"/>
+              <a:t>Project Grading	</a:t>
+            </a:r>
+          </a:p>
+        </p:txBody>
+      </p:sp>
+      <p:sp>
+        <p:nvSpPr>
+          <p:cNvPr id="3" name="Content Placeholder 2">
+            <a:extLst>
+              <a:ext uri="{FF2B5EF4-FFF2-40B4-BE49-F238E27FC236}">
+                <a16:creationId xmlns:a16="http://schemas.microsoft.com/office/drawing/2014/main" id="{98DBC5B0-0D3B-4804-AA22-77009216687E}"/>
+              </a:ext>
+            </a:extLst>
+          </p:cNvPr>
+          <p:cNvSpPr>
+            <a:spLocks noGrp="1"/>
+          </p:cNvSpPr>
+          <p:nvPr>
+            <p:ph idx="1"/>
+          </p:nvPr>
+        </p:nvSpPr>
+        <p:spPr/>
+        <p:txBody>
+          <a:bodyPr>
+            <a:normAutofit fontScale="92500" lnSpcReduction="20000"/>
+          </a:bodyPr>
+          <a:lstStyle/>
+          <a:p>
+            <a:r>
+              <a:rPr lang="en-US" dirty="0">
+                <a:solidFill>
+                  <a:schemeClr val="accent1">
+                    <a:lumMod val="60000"/>
+                    <a:lumOff val="40000"/>
+                  </a:schemeClr>
+                </a:solidFill>
+              </a:rPr>
+              <a:t>Formulation</a:t>
+            </a:r>
+            <a:endParaRPr lang="en-US" dirty="0"/>
+          </a:p>
+          <a:p>
+            <a:pPr lvl="1"/>
+            <a:r>
+              <a:rPr lang="en-US" dirty="0"/>
+              <a:t>How well did you formulate the problem?  Was it clear?  What were you trying to achieve?</a:t>
+            </a:r>
+          </a:p>
+          <a:p>
+            <a:r>
+              <a:rPr lang="en-US" dirty="0">
+                <a:solidFill>
+                  <a:schemeClr val="accent1">
+                    <a:lumMod val="60000"/>
+                    <a:lumOff val="40000"/>
+                  </a:schemeClr>
+                </a:solidFill>
+              </a:rPr>
+              <a:t>Approach and Design</a:t>
+            </a:r>
+            <a:endParaRPr lang="en-US" dirty="0"/>
+          </a:p>
+          <a:p>
+            <a:pPr lvl="1"/>
+            <a:r>
+              <a:rPr lang="en-US" dirty="0"/>
+              <a:t>Does your approach properly solve your problem?  Is the design logical?  Is the design robust?</a:t>
+            </a:r>
+          </a:p>
+          <a:p>
+            <a:r>
+              <a:rPr lang="en-US" dirty="0">
+                <a:solidFill>
+                  <a:schemeClr val="accent1">
+                    <a:lumMod val="60000"/>
+                    <a:lumOff val="40000"/>
+                  </a:schemeClr>
+                </a:solidFill>
+              </a:rPr>
+              <a:t>Evaluation and Interpretation</a:t>
+            </a:r>
+            <a:endParaRPr lang="en-US" dirty="0"/>
+          </a:p>
+          <a:p>
+            <a:pPr lvl="1"/>
+            <a:r>
+              <a:rPr lang="en-US" dirty="0"/>
+              <a:t>How did you evaluate the approach?  Were the metrics correct?  What were the test assumptions?</a:t>
+            </a:r>
+          </a:p>
+          <a:p>
+            <a:pPr lvl="1"/>
+            <a:r>
+              <a:rPr lang="en-US" dirty="0"/>
+              <a:t>Did you test against alternative approaches?</a:t>
+            </a:r>
+          </a:p>
+          <a:p>
+            <a:r>
+              <a:rPr lang="en-US" dirty="0">
+                <a:solidFill>
+                  <a:schemeClr val="accent1">
+                    <a:lumMod val="60000"/>
+                    <a:lumOff val="40000"/>
+                  </a:schemeClr>
+                </a:solidFill>
+              </a:rPr>
+              <a:t>Implementation</a:t>
+            </a:r>
+          </a:p>
+          <a:p>
+            <a:pPr lvl="1"/>
+            <a:r>
+              <a:rPr lang="en-US" dirty="0"/>
+              <a:t>Did the software work?  Was it well-structured, commented.  How modular is it?</a:t>
+            </a:r>
+          </a:p>
+          <a:p>
+            <a:r>
+              <a:rPr lang="en-US" dirty="0">
+                <a:solidFill>
+                  <a:schemeClr val="accent1">
+                    <a:lumMod val="60000"/>
+                    <a:lumOff val="40000"/>
+                  </a:schemeClr>
+                </a:solidFill>
+              </a:rPr>
+              <a:t>Presentation</a:t>
+            </a:r>
+            <a:r>
+              <a:rPr lang="en-US" dirty="0"/>
+              <a:t>  </a:t>
+            </a:r>
+          </a:p>
+          <a:p>
+            <a:pPr lvl="1"/>
+            <a:r>
+              <a:rPr lang="en-US" dirty="0"/>
+              <a:t>Were the ideas clear?  Were all the details conveyed.  Did you highlight the main points?</a:t>
+            </a:r>
+          </a:p>
+          <a:p>
+            <a:pPr lvl="1"/>
+            <a:r>
+              <a:rPr lang="en-US" dirty="0"/>
+              <a:t>You can select a number of formats.  Whatever makes sense.  A </a:t>
+            </a:r>
+            <a:r>
+              <a:rPr lang="en-US" dirty="0" err="1"/>
+              <a:t>github</a:t>
+            </a:r>
+            <a:r>
+              <a:rPr lang="en-US" dirty="0"/>
+              <a:t> page</a:t>
+            </a:r>
+          </a:p>
+          <a:p>
+            <a:r>
+              <a:rPr lang="en-US" dirty="0">
+                <a:solidFill>
+                  <a:schemeClr val="accent1">
+                    <a:lumMod val="60000"/>
+                    <a:lumOff val="40000"/>
+                  </a:schemeClr>
+                </a:solidFill>
+              </a:rPr>
+              <a:t>Bonus</a:t>
+            </a:r>
+          </a:p>
+          <a:p>
+            <a:pPr lvl="1"/>
+            <a:r>
+              <a:rPr lang="en-US" dirty="0">
+                <a:solidFill>
+                  <a:schemeClr val="tx1"/>
+                </a:solidFill>
+              </a:rPr>
+              <a:t>Given for particularly hard / novel research</a:t>
+            </a:r>
+          </a:p>
+        </p:txBody>
+      </p:sp>
+      <p:sp>
+        <p:nvSpPr>
+          <p:cNvPr id="4" name="Slide Number Placeholder 3">
+            <a:extLst>
+              <a:ext uri="{FF2B5EF4-FFF2-40B4-BE49-F238E27FC236}">
+                <a16:creationId xmlns:a16="http://schemas.microsoft.com/office/drawing/2014/main" id="{85FA53A8-2A5E-49EE-88AA-3E008B3D21B1}"/>
+              </a:ext>
+            </a:extLst>
+          </p:cNvPr>
+          <p:cNvSpPr>
+            <a:spLocks noGrp="1"/>
+          </p:cNvSpPr>
+          <p:nvPr>
+            <p:ph type="sldNum" sz="quarter" idx="12"/>
+          </p:nvPr>
+        </p:nvSpPr>
+        <p:spPr/>
+        <p:txBody>
+          <a:bodyPr/>
+          <a:lstStyle/>
+          <a:p>
+            <a:fld id="{629637A9-119A-49DA-BD12-AAC58B377D80}" type="slidenum">
+              <a:rPr lang="en-US" smtClean="0"/>
+              <a:t>17</a:t>
+            </a:fld>
+            <a:endParaRPr lang="en-US" dirty="0"/>
+          </a:p>
+        </p:txBody>
+      </p:sp>
+    </p:spTree>
+    <p:extLst>
+      <p:ext uri="{BB962C8B-B14F-4D97-AF65-F5344CB8AC3E}">
+        <p14:creationId xmlns:p14="http://schemas.microsoft.com/office/powerpoint/2010/main" val="2682996528"/>
+      </p:ext>
+    </p:extLst>
+  </p:cSld>
+  <p:clrMapOvr>
+    <a:masterClrMapping/>
+  </p:clrMapOvr>
+</p:sld>
+</file>
+
+<file path=ppt/slides/slide18.xml><?xml version="1.0" encoding="utf-8"?>
+<p:sld xmlns:a="http://schemas.openxmlformats.org/drawingml/2006/main" xmlns:r="http://schemas.openxmlformats.org/officeDocument/2006/relationships" xmlns:p="http://schemas.openxmlformats.org/presentationml/2006/main">
+  <p:cSld>
+    <p:spTree>
+      <p:nvGrpSpPr>
+        <p:cNvPr id="1" name=""/>
+        <p:cNvGrpSpPr/>
+        <p:nvPr/>
+      </p:nvGrpSpPr>
+      <p:grpSpPr>
+        <a:xfrm>
+          <a:off x="0" y="0"/>
+          <a:ext cx="0" cy="0"/>
+          <a:chOff x="0" y="0"/>
+          <a:chExt cx="0" cy="0"/>
+        </a:xfrm>
+      </p:grpSpPr>
+      <p:sp>
+        <p:nvSpPr>
+          <p:cNvPr id="2" name="Title 1">
+            <a:extLst>
+              <a:ext uri="{FF2B5EF4-FFF2-40B4-BE49-F238E27FC236}">
+                <a16:creationId xmlns:a16="http://schemas.microsoft.com/office/drawing/2014/main" id="{C9F03EB3-9B64-4C85-A225-CBF7437EB5B7}"/>
+              </a:ext>
+            </a:extLst>
+          </p:cNvPr>
+          <p:cNvSpPr>
+            <a:spLocks noGrp="1"/>
+          </p:cNvSpPr>
+          <p:nvPr>
+            <p:ph type="title"/>
+          </p:nvPr>
+        </p:nvSpPr>
+        <p:spPr/>
+        <p:txBody>
+          <a:bodyPr/>
+          <a:lstStyle/>
+          <a:p>
+            <a:r>
+              <a:rPr lang="en-US" dirty="0"/>
+              <a:t>Many Resources for Your Projects</a:t>
+            </a:r>
+          </a:p>
+        </p:txBody>
+      </p:sp>
+      <p:sp>
+        <p:nvSpPr>
+          <p:cNvPr id="3" name="Content Placeholder 2">
+            <a:extLst>
+              <a:ext uri="{FF2B5EF4-FFF2-40B4-BE49-F238E27FC236}">
+                <a16:creationId xmlns:a16="http://schemas.microsoft.com/office/drawing/2014/main" id="{5830F1D5-D160-40FA-B3DD-CFC2F4EC666A}"/>
+              </a:ext>
+            </a:extLst>
+          </p:cNvPr>
+          <p:cNvSpPr>
+            <a:spLocks noGrp="1"/>
+          </p:cNvSpPr>
+          <p:nvPr>
+            <p:ph idx="1"/>
+          </p:nvPr>
+        </p:nvSpPr>
+        <p:spPr/>
+        <p:txBody>
+          <a:bodyPr>
+            <a:normAutofit/>
+          </a:bodyPr>
+          <a:lstStyle/>
+          <a:p>
+            <a:r>
+              <a:rPr lang="en-US" dirty="0"/>
+              <a:t>You will simulate an end-to-end system of your choice</a:t>
+            </a:r>
+          </a:p>
+          <a:p>
+            <a:r>
+              <a:rPr lang="en-US" dirty="0"/>
+              <a:t>Your project should comprehensively test at least one component</a:t>
+            </a:r>
+          </a:p>
+          <a:p>
+            <a:pPr lvl="1"/>
+            <a:r>
+              <a:rPr lang="en-US" dirty="0"/>
+              <a:t>Ex:  equalization, effect of phase noise, …</a:t>
+            </a:r>
+          </a:p>
+          <a:p>
+            <a:endParaRPr lang="en-US" dirty="0"/>
+          </a:p>
+          <a:p>
+            <a:r>
+              <a:rPr lang="en-US" dirty="0"/>
+              <a:t>Many great resources:</a:t>
+            </a:r>
+          </a:p>
+          <a:p>
+            <a:pPr lvl="1"/>
+            <a:r>
+              <a:rPr lang="en-US" dirty="0"/>
+              <a:t>MATLAB 5G toolbox</a:t>
+            </a:r>
+          </a:p>
+          <a:p>
+            <a:pPr lvl="1"/>
+            <a:r>
+              <a:rPr lang="en-US" dirty="0"/>
+              <a:t>MATLAB HDL generator</a:t>
+            </a:r>
+          </a:p>
+          <a:p>
+            <a:pPr lvl="1"/>
+            <a:r>
+              <a:rPr lang="en-US" dirty="0"/>
+              <a:t>Orbit testbed in Rutgers</a:t>
+            </a:r>
+          </a:p>
+          <a:p>
+            <a:pPr lvl="1"/>
+            <a:r>
+              <a:rPr lang="en-US" dirty="0"/>
+              <a:t>ADAM Pluto</a:t>
+            </a:r>
+          </a:p>
+          <a:p>
+            <a:pPr lvl="1"/>
+            <a:endParaRPr lang="en-US" dirty="0"/>
+          </a:p>
+          <a:p>
+            <a:endParaRPr lang="en-US" dirty="0"/>
+          </a:p>
+          <a:p>
+            <a:endParaRPr lang="en-US" dirty="0"/>
+          </a:p>
+        </p:txBody>
+      </p:sp>
+      <p:sp>
+        <p:nvSpPr>
+          <p:cNvPr id="4" name="Slide Number Placeholder 3">
+            <a:extLst>
+              <a:ext uri="{FF2B5EF4-FFF2-40B4-BE49-F238E27FC236}">
+                <a16:creationId xmlns:a16="http://schemas.microsoft.com/office/drawing/2014/main" id="{D847B470-B464-43B3-A413-C2CE46BC432C}"/>
+              </a:ext>
+            </a:extLst>
+          </p:cNvPr>
+          <p:cNvSpPr>
+            <a:spLocks noGrp="1"/>
+          </p:cNvSpPr>
+          <p:nvPr>
+            <p:ph type="sldNum" sz="quarter" idx="12"/>
+          </p:nvPr>
+        </p:nvSpPr>
+        <p:spPr/>
+        <p:txBody>
+          <a:bodyPr/>
+          <a:lstStyle/>
+          <a:p>
+            <a:fld id="{629637A9-119A-49DA-BD12-AAC58B377D80}" type="slidenum">
+              <a:rPr lang="en-US" smtClean="0"/>
+              <a:t>18</a:t>
+            </a:fld>
+            <a:endParaRPr lang="en-US" dirty="0"/>
+          </a:p>
+        </p:txBody>
+      </p:sp>
+      <p:pic>
+        <p:nvPicPr>
+          <p:cNvPr id="4098" name="Picture 2" descr="Image result for adam pluto">
+            <a:extLst>
+              <a:ext uri="{FF2B5EF4-FFF2-40B4-BE49-F238E27FC236}">
+                <a16:creationId xmlns:a16="http://schemas.microsoft.com/office/drawing/2014/main" id="{4C50AF61-A036-4309-9EBC-EA6260C66316}"/>
+              </a:ext>
+            </a:extLst>
+          </p:cNvPr>
+          <p:cNvPicPr>
+            <a:picLocks noChangeAspect="1" noChangeArrowheads="1"/>
+          </p:cNvPicPr>
+          <p:nvPr/>
+        </p:nvPicPr>
+        <p:blipFill>
+          <a:blip r:embed="rId2">
+            <a:extLst>
+              <a:ext uri="{28A0092B-C50C-407E-A947-70E740481C1C}">
+                <a14:useLocalDpi xmlns:a14="http://schemas.microsoft.com/office/drawing/2010/main" val="0"/>
+              </a:ext>
+            </a:extLst>
+          </a:blip>
+          <a:srcRect/>
+          <a:stretch>
+            <a:fillRect/>
+          </a:stretch>
+        </p:blipFill>
+        <p:spPr bwMode="auto">
+          <a:xfrm>
+            <a:off x="8220419" y="1771988"/>
+            <a:ext cx="2438400" cy="1876425"/>
+          </a:xfrm>
+          <a:prstGeom prst="rect">
+            <a:avLst/>
+          </a:prstGeom>
+          <a:noFill/>
+          <a:extLst>
+            <a:ext uri="{909E8E84-426E-40DD-AFC4-6F175D3DCCD1}">
+              <a14:hiddenFill xmlns:a14="http://schemas.microsoft.com/office/drawing/2010/main">
+                <a:solidFill>
+                  <a:srgbClr val="FFFFFF"/>
+                </a:solidFill>
+              </a14:hiddenFill>
+            </a:ext>
+          </a:extLst>
+        </p:spPr>
+      </p:pic>
+      <p:pic>
+        <p:nvPicPr>
+          <p:cNvPr id="4100" name="Picture 4" descr="Image result for adalm pluto matlab">
+            <a:extLst>
+              <a:ext uri="{FF2B5EF4-FFF2-40B4-BE49-F238E27FC236}">
+                <a16:creationId xmlns:a16="http://schemas.microsoft.com/office/drawing/2014/main" id="{92FFCF2F-5B43-4FD2-960C-DA65DF71E4A7}"/>
+              </a:ext>
+            </a:extLst>
+          </p:cNvPr>
+          <p:cNvPicPr>
+            <a:picLocks noChangeAspect="1" noChangeArrowheads="1"/>
+          </p:cNvPicPr>
+          <p:nvPr/>
+        </p:nvPicPr>
+        <p:blipFill>
+          <a:blip r:embed="rId3">
+            <a:extLst>
+              <a:ext uri="{28A0092B-C50C-407E-A947-70E740481C1C}">
+                <a14:useLocalDpi xmlns:a14="http://schemas.microsoft.com/office/drawing/2010/main" val="0"/>
+              </a:ext>
+            </a:extLst>
+          </a:blip>
+          <a:srcRect/>
+          <a:stretch>
+            <a:fillRect/>
+          </a:stretch>
+        </p:blipFill>
+        <p:spPr bwMode="auto">
+          <a:xfrm>
+            <a:off x="7537358" y="4296335"/>
+            <a:ext cx="3343275" cy="1371600"/>
+          </a:xfrm>
+          <a:prstGeom prst="rect">
+            <a:avLst/>
+          </a:prstGeom>
+          <a:noFill/>
+          <a:extLst>
+            <a:ext uri="{909E8E84-426E-40DD-AFC4-6F175D3DCCD1}">
+              <a14:hiddenFill xmlns:a14="http://schemas.microsoft.com/office/drawing/2010/main">
+                <a:solidFill>
+                  <a:srgbClr val="FFFFFF"/>
+                </a:solidFill>
+              </a14:hiddenFill>
+            </a:ext>
+          </a:extLst>
+        </p:spPr>
+      </p:pic>
+    </p:spTree>
+    <p:extLst>
+      <p:ext uri="{BB962C8B-B14F-4D97-AF65-F5344CB8AC3E}">
+        <p14:creationId xmlns:p14="http://schemas.microsoft.com/office/powerpoint/2010/main" val="137241302"/>
       </p:ext>
     </p:extLst>
   </p:cSld>
@@ -7727,21 +8461,37 @@
             <a:pPr lvl="1"/>
             <a:r>
               <a:rPr lang="en-US" dirty="0"/>
-              <a:t>370 Jay St.  </a:t>
-            </a:r>
-          </a:p>
-          <a:p>
-            <a:pPr lvl="1"/>
-            <a:r>
-              <a:rPr lang="en-US" dirty="0"/>
-              <a:t>Office Hours:  Thursdays, 2-4pm</a:t>
+              <a:t>Office Hours:  Mondays  11am-12pm</a:t>
             </a:r>
           </a:p>
           <a:p>
             <a:r>
               <a:rPr lang="de-DE" dirty="0"/>
-              <a:t>TA:  TBD</a:t>
-            </a:r>
+              <a:t>TA:  </a:t>
+            </a:r>
+            <a:r>
+              <a:rPr lang="en-US" sz="1800" dirty="0">
+                <a:effectLst/>
+                <a:latin typeface="Calibri" panose="020F0502020204030204" pitchFamily="34" charset="0"/>
+                <a:ea typeface="Times New Roman" panose="02020603050405020304" pitchFamily="18" charset="0"/>
+                <a:cs typeface="Times New Roman" panose="02020603050405020304" pitchFamily="18" charset="0"/>
+              </a:rPr>
+              <a:t>Syed Hashim Ali Shah, </a:t>
+            </a:r>
+            <a:r>
+              <a:rPr lang="en-US" sz="1800" u="sng" dirty="0">
+                <a:solidFill>
+                  <a:srgbClr val="0000FF"/>
+                </a:solidFill>
+                <a:effectLst/>
+                <a:latin typeface="Calibri" panose="020F0502020204030204" pitchFamily="34" charset="0"/>
+                <a:ea typeface="Times New Roman" panose="02020603050405020304" pitchFamily="18" charset="0"/>
+                <a:cs typeface="Times New Roman" panose="02020603050405020304" pitchFamily="18" charset="0"/>
+                <a:hlinkClick r:id="rId3"/>
+              </a:rPr>
+              <a:t>shs515@nyu.edu</a:t>
+            </a:r>
+            <a:endParaRPr lang="de-DE" dirty="0"/>
           </a:p>
           <a:p>
             <a:pPr lvl="1"/>

</xml_diff>

<commit_message>
--Changed m to mlx files --Updated the course admin
</commit_message>
<xml_diff>
--- a/lectures/CourseAdmin.pptx
+++ b/lectures/CourseAdmin.pptx
@@ -225,7 +225,7 @@
           <a:p>
             <a:fld id="{B7D6DDD3-D7E9-488B-B626-1E8285E424D8}" type="datetimeFigureOut">
               <a:rPr lang="en-US" smtClean="0"/>
-              <a:t>2/2/2021</a:t>
+              <a:t>1/24/2022</a:t>
             </a:fld>
             <a:endParaRPr lang="en-US"/>
           </a:p>
@@ -4168,7 +4168,7 @@
           <a:p>
             <a:r>
               <a:rPr lang="en-US" dirty="0"/>
-              <a:t>Also of interest to:</a:t>
+              <a:t>Course may also be of interest to:</a:t>
             </a:r>
           </a:p>
           <a:p>
@@ -7114,15 +7114,7 @@
           <a:p>
             <a:r>
               <a:rPr lang="en-US" dirty="0"/>
-              <a:t>Similar to </a:t>
-            </a:r>
-            <a:r>
-              <a:rPr lang="en-US" dirty="0" err="1"/>
-              <a:t>Pyhton</a:t>
-            </a:r>
-            <a:r>
-              <a:rPr lang="en-US" dirty="0"/>
-              <a:t> </a:t>
+              <a:t>Similar to Python </a:t>
             </a:r>
             <a:r>
               <a:rPr lang="en-US" dirty="0" err="1"/>
@@ -8467,7 +8459,7 @@
           <a:p>
             <a:r>
               <a:rPr lang="de-DE" dirty="0"/>
-              <a:t>TA:  </a:t>
+              <a:t>Course Assitant:  </a:t>
             </a:r>
             <a:r>
               <a:rPr lang="en-US" sz="1800" dirty="0">
@@ -8476,7 +8468,25 @@
                 <a:ea typeface="Times New Roman" panose="02020603050405020304" pitchFamily="18" charset="0"/>
                 <a:cs typeface="Times New Roman" panose="02020603050405020304" pitchFamily="18" charset="0"/>
               </a:rPr>
-              <a:t>Syed Hashim Ali Shah, </a:t>
+              <a:t>Panagiotis </a:t>
+            </a:r>
+            <a:r>
+              <a:rPr lang="en-US" sz="1800" dirty="0" err="1">
+                <a:effectLst/>
+                <a:latin typeface="Calibri" panose="020F0502020204030204" pitchFamily="34" charset="0"/>
+                <a:ea typeface="Times New Roman" panose="02020603050405020304" pitchFamily="18" charset="0"/>
+                <a:cs typeface="Times New Roman" panose="02020603050405020304" pitchFamily="18" charset="0"/>
+              </a:rPr>
+              <a:t>Skrimponis</a:t>
+            </a:r>
+            <a:r>
+              <a:rPr lang="en-US" sz="1800" dirty="0">
+                <a:effectLst/>
+                <a:latin typeface="Calibri" panose="020F0502020204030204" pitchFamily="34" charset="0"/>
+                <a:ea typeface="Times New Roman" panose="02020603050405020304" pitchFamily="18" charset="0"/>
+                <a:cs typeface="Times New Roman" panose="02020603050405020304" pitchFamily="18" charset="0"/>
+              </a:rPr>
+              <a:t>, </a:t>
             </a:r>
             <a:r>
               <a:rPr lang="en-US" sz="1800" u="sng" dirty="0">
@@ -8489,7 +8499,7 @@
                 <a:cs typeface="Times New Roman" panose="02020603050405020304" pitchFamily="18" charset="0"/>
                 <a:hlinkClick r:id="rId3"/>
               </a:rPr>
-              <a:t>shs515@nyu.edu</a:t>
+              <a:t>pa3857@nyu.edu</a:t>
             </a:r>
             <a:endParaRPr lang="de-DE" dirty="0"/>
           </a:p>
@@ -8503,27 +8513,14 @@
           <a:p>
             <a:r>
               <a:rPr lang="de-DE" dirty="0"/>
-              <a:t>Online lectures:  All lectures will be made available on YouTube.</a:t>
+              <a:t>Class time:  Tuesdays 11 to 1:30pm, RH 213</a:t>
             </a:r>
           </a:p>
           <a:p>
             <a:pPr lvl="1"/>
             <a:r>
               <a:rPr lang="de-DE" dirty="0"/>
-              <a:t>Listen to these whenever you like</a:t>
-            </a:r>
-          </a:p>
-          <a:p>
-            <a:r>
-              <a:rPr lang="de-DE" dirty="0"/>
-              <a:t>Zoom class time:  Tuesday 2 to 4:30pm</a:t>
-            </a:r>
-          </a:p>
-          <a:p>
-            <a:pPr lvl="1"/>
-            <a:r>
-              <a:rPr lang="de-DE" dirty="0"/>
-              <a:t>Go over problems and labs</a:t>
+              <a:t>I will try to also broadcast on Zoom for those unable to attend</a:t>
             </a:r>
           </a:p>
           <a:p>
@@ -8531,6 +8528,39 @@
             <a:r>
               <a:rPr lang="de-DE" dirty="0"/>
               <a:t>Attendance is optional</a:t>
+            </a:r>
+          </a:p>
+          <a:p>
+            <a:pPr lvl="1"/>
+            <a:r>
+              <a:rPr lang="de-DE" dirty="0"/>
+              <a:t>Lectures and problems</a:t>
+            </a:r>
+          </a:p>
+          <a:p>
+            <a:r>
+              <a:rPr lang="de-DE" dirty="0"/>
+              <a:t>Online lectures from previous year available on YouTube.</a:t>
+            </a:r>
+          </a:p>
+          <a:p>
+            <a:pPr lvl="1"/>
+            <a:r>
+              <a:rPr lang="de-DE" dirty="0">
+                <a:hlinkClick r:id="rId4"/>
+              </a:rPr>
+              <a:t>YouTube Wireless comm playlist</a:t>
+            </a:r>
+            <a:r>
+              <a:rPr lang="de-DE" dirty="0"/>
+              <a:t> </a:t>
+            </a:r>
+          </a:p>
+          <a:p>
+            <a:pPr lvl="1"/>
+            <a:r>
+              <a:rPr lang="de-DE" dirty="0"/>
+              <a:t>I may add / modify these, this semester</a:t>
             </a:r>
           </a:p>
         </p:txBody>

</xml_diff>

<commit_message>
Updated the readme file and course admin
</commit_message>
<xml_diff>
--- a/lectures/CourseAdmin.pptx
+++ b/lectures/CourseAdmin.pptx
@@ -5,7 +5,7 @@
     <p:sldMasterId id="2147483648" r:id="rId1"/>
   </p:sldMasterIdLst>
   <p:notesMasterIdLst>
-    <p:notesMasterId r:id="rId20"/>
+    <p:notesMasterId r:id="rId22"/>
   </p:notesMasterIdLst>
   <p:sldIdLst>
     <p:sldId id="258" r:id="rId2"/>
@@ -20,12 +20,14 @@
     <p:sldId id="402" r:id="rId11"/>
     <p:sldId id="417" r:id="rId12"/>
     <p:sldId id="418" r:id="rId13"/>
-    <p:sldId id="406" r:id="rId14"/>
-    <p:sldId id="419" r:id="rId15"/>
-    <p:sldId id="400" r:id="rId16"/>
-    <p:sldId id="802" r:id="rId17"/>
-    <p:sldId id="272" r:id="rId18"/>
-    <p:sldId id="411" r:id="rId19"/>
+    <p:sldId id="804" r:id="rId14"/>
+    <p:sldId id="406" r:id="rId15"/>
+    <p:sldId id="419" r:id="rId16"/>
+    <p:sldId id="803" r:id="rId17"/>
+    <p:sldId id="400" r:id="rId18"/>
+    <p:sldId id="802" r:id="rId19"/>
+    <p:sldId id="272" r:id="rId20"/>
+    <p:sldId id="411" r:id="rId21"/>
   </p:sldIdLst>
   <p:sldSz cx="12192000" cy="6858000"/>
   <p:notesSz cx="7315200" cy="9601200"/>
@@ -225,7 +227,7 @@
           <a:p>
             <a:fld id="{B7D6DDD3-D7E9-488B-B626-1E8285E424D8}" type="datetimeFigureOut">
               <a:rPr lang="en-US" smtClean="0"/>
-              <a:t>1/24/2022</a:t>
+              <a:t>1/24/2024</a:t>
             </a:fld>
             <a:endParaRPr lang="en-US"/>
           </a:p>
@@ -6160,6 +6162,256 @@
           <p:cNvPr id="2" name="Title 1">
             <a:extLst>
               <a:ext uri="{FF2B5EF4-FFF2-40B4-BE49-F238E27FC236}">
+                <a16:creationId xmlns:a16="http://schemas.microsoft.com/office/drawing/2014/main" id="{9F7EA4C7-1292-455C-8BB4-E9C4077BD268}"/>
+              </a:ext>
+            </a:extLst>
+          </p:cNvPr>
+          <p:cNvSpPr>
+            <a:spLocks noGrp="1"/>
+          </p:cNvSpPr>
+          <p:nvPr>
+            <p:ph type="title"/>
+          </p:nvPr>
+        </p:nvSpPr>
+        <p:spPr/>
+        <p:txBody>
+          <a:bodyPr/>
+          <a:lstStyle/>
+          <a:p>
+            <a:r>
+              <a:rPr lang="en-US" dirty="0"/>
+              <a:t>Digital Communications</a:t>
+            </a:r>
+          </a:p>
+        </p:txBody>
+      </p:sp>
+      <p:sp>
+        <p:nvSpPr>
+          <p:cNvPr id="3" name="Content Placeholder 2">
+            <a:extLst>
+              <a:ext uri="{FF2B5EF4-FFF2-40B4-BE49-F238E27FC236}">
+                <a16:creationId xmlns:a16="http://schemas.microsoft.com/office/drawing/2014/main" id="{F829FF7D-11C3-4D2C-8A40-6919AA324980}"/>
+              </a:ext>
+            </a:extLst>
+          </p:cNvPr>
+          <p:cNvSpPr>
+            <a:spLocks noGrp="1"/>
+          </p:cNvSpPr>
+          <p:nvPr>
+            <p:ph idx="1"/>
+          </p:nvPr>
+        </p:nvSpPr>
+        <p:spPr/>
+        <p:txBody>
+          <a:bodyPr/>
+          <a:lstStyle/>
+          <a:p>
+            <a:r>
+              <a:rPr lang="en-US" dirty="0" err="1"/>
+              <a:t>Github</a:t>
+            </a:r>
+            <a:r>
+              <a:rPr lang="en-US" dirty="0"/>
+              <a:t> site for digital communications:</a:t>
+            </a:r>
+            <a:br>
+              <a:rPr lang="en-US" dirty="0"/>
+            </a:br>
+            <a:r>
+              <a:rPr lang="en-US" dirty="0">
+                <a:hlinkClick r:id="rId2"/>
+              </a:rPr>
+              <a:t>https://github.com/sdrangan/digitalcomm</a:t>
+            </a:r>
+            <a:r>
+              <a:rPr lang="en-US" dirty="0"/>
+              <a:t> </a:t>
+            </a:r>
+          </a:p>
+          <a:p>
+            <a:r>
+              <a:rPr lang="en-US" dirty="0"/>
+              <a:t>This class (or equivalent) is a pre-req </a:t>
+            </a:r>
+          </a:p>
+          <a:p>
+            <a:r>
+              <a:rPr lang="en-US" dirty="0"/>
+              <a:t>Use this material for review if needed</a:t>
+            </a:r>
+          </a:p>
+          <a:p>
+            <a:r>
+              <a:rPr lang="en-US" dirty="0" err="1"/>
+              <a:t>Github</a:t>
+            </a:r>
+            <a:r>
+              <a:rPr lang="en-US" dirty="0"/>
+              <a:t> site has:</a:t>
+            </a:r>
+          </a:p>
+          <a:p>
+            <a:pPr lvl="1"/>
+            <a:r>
+              <a:rPr lang="en-US" dirty="0"/>
+              <a:t>Lecture slides</a:t>
+            </a:r>
+          </a:p>
+          <a:p>
+            <a:pPr lvl="1"/>
+            <a:r>
+              <a:rPr lang="en-US" dirty="0"/>
+              <a:t>In-class MATLAB exercises</a:t>
+            </a:r>
+          </a:p>
+          <a:p>
+            <a:pPr lvl="1"/>
+            <a:r>
+              <a:rPr lang="en-US" dirty="0"/>
+              <a:t>Problems and labs</a:t>
+            </a:r>
+          </a:p>
+          <a:p>
+            <a:pPr lvl="1"/>
+            <a:r>
+              <a:rPr lang="en-US" dirty="0"/>
+              <a:t>But no videos</a:t>
+            </a:r>
+          </a:p>
+          <a:p>
+            <a:pPr lvl="1"/>
+            <a:endParaRPr lang="en-US" dirty="0"/>
+          </a:p>
+          <a:p>
+            <a:pPr lvl="1"/>
+            <a:endParaRPr lang="en-US" dirty="0"/>
+          </a:p>
+        </p:txBody>
+      </p:sp>
+      <p:sp>
+        <p:nvSpPr>
+          <p:cNvPr id="4" name="Slide Number Placeholder 3">
+            <a:extLst>
+              <a:ext uri="{FF2B5EF4-FFF2-40B4-BE49-F238E27FC236}">
+                <a16:creationId xmlns:a16="http://schemas.microsoft.com/office/drawing/2014/main" id="{9BB08561-D4B2-450E-9EFB-DA3F06F2A900}"/>
+              </a:ext>
+            </a:extLst>
+          </p:cNvPr>
+          <p:cNvSpPr>
+            <a:spLocks noGrp="1"/>
+          </p:cNvSpPr>
+          <p:nvPr>
+            <p:ph type="sldNum" sz="quarter" idx="12"/>
+          </p:nvPr>
+        </p:nvSpPr>
+        <p:spPr/>
+        <p:txBody>
+          <a:bodyPr/>
+          <a:lstStyle/>
+          <a:p>
+            <a:fld id="{629637A9-119A-49DA-BD12-AAC58B377D80}" type="slidenum">
+              <a:rPr lang="en-US" smtClean="0"/>
+              <a:t>13</a:t>
+            </a:fld>
+            <a:endParaRPr lang="en-US" dirty="0"/>
+          </a:p>
+        </p:txBody>
+      </p:sp>
+      <p:pic>
+        <p:nvPicPr>
+          <p:cNvPr id="7" name="Picture 6">
+            <a:extLst>
+              <a:ext uri="{FF2B5EF4-FFF2-40B4-BE49-F238E27FC236}">
+                <a16:creationId xmlns:a16="http://schemas.microsoft.com/office/drawing/2014/main" id="{7698C898-4AF2-6DF4-199C-12DD7509FE5F}"/>
+              </a:ext>
+            </a:extLst>
+          </p:cNvPr>
+          <p:cNvPicPr>
+            <a:picLocks noChangeAspect="1"/>
+          </p:cNvPicPr>
+          <p:nvPr/>
+        </p:nvPicPr>
+        <p:blipFill>
+          <a:blip r:embed="rId3"/>
+          <a:stretch>
+            <a:fillRect/>
+          </a:stretch>
+        </p:blipFill>
+        <p:spPr>
+          <a:xfrm>
+            <a:off x="6051723" y="1539277"/>
+            <a:ext cx="5531857" cy="1580531"/>
+          </a:xfrm>
+          <a:prstGeom prst="rect">
+            <a:avLst/>
+          </a:prstGeom>
+        </p:spPr>
+      </p:pic>
+      <p:pic>
+        <p:nvPicPr>
+          <p:cNvPr id="9" name="Picture 8">
+            <a:extLst>
+              <a:ext uri="{FF2B5EF4-FFF2-40B4-BE49-F238E27FC236}">
+                <a16:creationId xmlns:a16="http://schemas.microsoft.com/office/drawing/2014/main" id="{C9853D9D-2FF5-8365-EB19-08DD04E096A5}"/>
+              </a:ext>
+            </a:extLst>
+          </p:cNvPr>
+          <p:cNvPicPr>
+            <a:picLocks noChangeAspect="1"/>
+          </p:cNvPicPr>
+          <p:nvPr/>
+        </p:nvPicPr>
+        <p:blipFill>
+          <a:blip r:embed="rId4"/>
+          <a:stretch>
+            <a:fillRect/>
+          </a:stretch>
+        </p:blipFill>
+        <p:spPr>
+          <a:xfrm>
+            <a:off x="6096000" y="3334452"/>
+            <a:ext cx="5371687" cy="2747105"/>
+          </a:xfrm>
+          <a:prstGeom prst="rect">
+            <a:avLst/>
+          </a:prstGeom>
+        </p:spPr>
+      </p:pic>
+    </p:spTree>
+    <p:extLst>
+      <p:ext uri="{BB962C8B-B14F-4D97-AF65-F5344CB8AC3E}">
+        <p14:creationId xmlns:p14="http://schemas.microsoft.com/office/powerpoint/2010/main" val="3960004394"/>
+      </p:ext>
+    </p:extLst>
+  </p:cSld>
+  <p:clrMapOvr>
+    <a:masterClrMapping/>
+  </p:clrMapOvr>
+</p:sld>
+</file>
+
+<file path=ppt/slides/slide14.xml><?xml version="1.0" encoding="utf-8"?>
+<p:sld xmlns:a="http://schemas.openxmlformats.org/drawingml/2006/main" xmlns:r="http://schemas.openxmlformats.org/officeDocument/2006/relationships" xmlns:p="http://schemas.openxmlformats.org/presentationml/2006/main">
+  <p:cSld>
+    <p:spTree>
+      <p:nvGrpSpPr>
+        <p:cNvPr id="1" name=""/>
+        <p:cNvGrpSpPr/>
+        <p:nvPr/>
+      </p:nvGrpSpPr>
+      <p:grpSpPr>
+        <a:xfrm>
+          <a:off x="0" y="0"/>
+          <a:ext cx="0" cy="0"/>
+          <a:chOff x="0" y="0"/>
+          <a:chExt cx="0" cy="0"/>
+        </a:xfrm>
+      </p:grpSpPr>
+      <p:sp>
+        <p:nvSpPr>
+          <p:cNvPr id="2" name="Title 1">
+            <a:extLst>
+              <a:ext uri="{FF2B5EF4-FFF2-40B4-BE49-F238E27FC236}">
                 <a16:creationId xmlns:a16="http://schemas.microsoft.com/office/drawing/2014/main" id="{BC21C850-AB28-4799-BDC9-9F739A9F7F0F}"/>
               </a:ext>
             </a:extLst>
@@ -6252,7 +6504,7 @@
             <a:pPr lvl="1"/>
             <a:r>
               <a:rPr lang="en-US" dirty="0"/>
-              <a:t>Make sure you get R2020B (Latest version)</a:t>
+              <a:t>Make sure you get R2023B (Latest version)</a:t>
             </a:r>
           </a:p>
           <a:p>
@@ -6336,7 +6588,7 @@
           <a:p>
             <a:fld id="{629637A9-119A-49DA-BD12-AAC58B377D80}" type="slidenum">
               <a:rPr lang="en-US" smtClean="0"/>
-              <a:t>13</a:t>
+              <a:t>14</a:t>
             </a:fld>
             <a:endParaRPr lang="en-US" dirty="0"/>
           </a:p>
@@ -7028,7 +7280,7 @@
 </p:sld>
 </file>
 
-<file path=ppt/slides/slide14.xml><?xml version="1.0" encoding="utf-8"?>
+<file path=ppt/slides/slide15.xml><?xml version="1.0" encoding="utf-8"?>
 <p:sld xmlns:a="http://schemas.openxmlformats.org/drawingml/2006/main" xmlns:r="http://schemas.openxmlformats.org/officeDocument/2006/relationships" xmlns:p="http://schemas.openxmlformats.org/presentationml/2006/main">
   <p:cSld>
     <p:spTree>
@@ -7182,7 +7434,7 @@
           <a:p>
             <a:fld id="{629637A9-119A-49DA-BD12-AAC58B377D80}" type="slidenum">
               <a:rPr lang="en-US" smtClean="0"/>
-              <a:t>14</a:t>
+              <a:t>15</a:t>
             </a:fld>
             <a:endParaRPr lang="en-US" dirty="0"/>
           </a:p>
@@ -7494,7 +7746,378 @@
 </p:sld>
 </file>
 
-<file path=ppt/slides/slide15.xml><?xml version="1.0" encoding="utf-8"?>
+<file path=ppt/slides/slide16.xml><?xml version="1.0" encoding="utf-8"?>
+<p:sld xmlns:a="http://schemas.openxmlformats.org/drawingml/2006/main" xmlns:r="http://schemas.openxmlformats.org/officeDocument/2006/relationships" xmlns:p="http://schemas.openxmlformats.org/presentationml/2006/main">
+  <p:cSld>
+    <p:spTree>
+      <p:nvGrpSpPr>
+        <p:cNvPr id="1" name=""/>
+        <p:cNvGrpSpPr/>
+        <p:nvPr/>
+      </p:nvGrpSpPr>
+      <p:grpSpPr>
+        <a:xfrm>
+          <a:off x="0" y="0"/>
+          <a:ext cx="0" cy="0"/>
+          <a:chOff x="0" y="0"/>
+          <a:chExt cx="0" cy="0"/>
+        </a:xfrm>
+      </p:grpSpPr>
+      <p:sp>
+        <p:nvSpPr>
+          <p:cNvPr id="2" name="Title 1">
+            <a:extLst>
+              <a:ext uri="{FF2B5EF4-FFF2-40B4-BE49-F238E27FC236}">
+                <a16:creationId xmlns:a16="http://schemas.microsoft.com/office/drawing/2014/main" id="{C9F03EB3-9B64-4C85-A225-CBF7437EB5B7}"/>
+              </a:ext>
+            </a:extLst>
+          </p:cNvPr>
+          <p:cNvSpPr>
+            <a:spLocks noGrp="1"/>
+          </p:cNvSpPr>
+          <p:nvPr>
+            <p:ph type="title"/>
+          </p:nvPr>
+        </p:nvSpPr>
+        <p:spPr/>
+        <p:txBody>
+          <a:bodyPr/>
+          <a:lstStyle/>
+          <a:p>
+            <a:r>
+              <a:rPr lang="en-US" dirty="0"/>
+              <a:t>Software-Defined Radio (SDR) Labs</a:t>
+            </a:r>
+          </a:p>
+        </p:txBody>
+      </p:sp>
+      <p:sp>
+        <p:nvSpPr>
+          <p:cNvPr id="3" name="Content Placeholder 2">
+            <a:extLst>
+              <a:ext uri="{FF2B5EF4-FFF2-40B4-BE49-F238E27FC236}">
+                <a16:creationId xmlns:a16="http://schemas.microsoft.com/office/drawing/2014/main" id="{5830F1D5-D160-40FA-B3DD-CFC2F4EC666A}"/>
+              </a:ext>
+            </a:extLst>
+          </p:cNvPr>
+          <p:cNvSpPr>
+            <a:spLocks noGrp="1"/>
+          </p:cNvSpPr>
+          <p:nvPr>
+            <p:ph idx="1"/>
+          </p:nvPr>
+        </p:nvSpPr>
+        <p:spPr/>
+        <p:txBody>
+          <a:bodyPr>
+            <a:normAutofit lnSpcReduction="10000"/>
+          </a:bodyPr>
+          <a:lstStyle/>
+          <a:p>
+            <a:r>
+              <a:rPr lang="en-US" dirty="0"/>
+              <a:t>Based on ADALM-Pluto devices</a:t>
+            </a:r>
+          </a:p>
+          <a:p>
+            <a:pPr lvl="1"/>
+            <a:r>
+              <a:rPr lang="en-US" dirty="0"/>
+              <a:t>Simple, but powerful</a:t>
+            </a:r>
+          </a:p>
+          <a:p>
+            <a:pPr lvl="1"/>
+            <a:r>
+              <a:rPr lang="en-US" dirty="0"/>
+              <a:t>Low cost</a:t>
+            </a:r>
+          </a:p>
+          <a:p>
+            <a:r>
+              <a:rPr lang="en-US" dirty="0"/>
+              <a:t>Used in non-real-time mode</a:t>
+            </a:r>
+          </a:p>
+          <a:p>
+            <a:pPr lvl="1"/>
+            <a:r>
+              <a:rPr lang="en-US" dirty="0"/>
+              <a:t>TX and RX signals over the air</a:t>
+            </a:r>
+          </a:p>
+          <a:p>
+            <a:pPr lvl="1"/>
+            <a:r>
+              <a:rPr lang="en-US" dirty="0"/>
+              <a:t>Analyze offline in MATLAB</a:t>
+            </a:r>
+          </a:p>
+          <a:p>
+            <a:r>
+              <a:rPr lang="en-US" dirty="0"/>
+              <a:t>Continue labs from digital communications</a:t>
+            </a:r>
+          </a:p>
+          <a:p>
+            <a:pPr lvl="1"/>
+            <a:r>
+              <a:rPr lang="en-US" dirty="0"/>
+              <a:t>Measure and analyze fading channels</a:t>
+            </a:r>
+          </a:p>
+          <a:p>
+            <a:pPr lvl="1"/>
+            <a:r>
+              <a:rPr lang="en-US" dirty="0"/>
+              <a:t>Equalization</a:t>
+            </a:r>
+          </a:p>
+          <a:p>
+            <a:pPr lvl="1"/>
+            <a:r>
+              <a:rPr lang="en-US" dirty="0"/>
+              <a:t>Coding</a:t>
+            </a:r>
+          </a:p>
+          <a:p>
+            <a:r>
+              <a:rPr lang="en-US" dirty="0"/>
+              <a:t>May add labs additional labs for MIMO</a:t>
+            </a:r>
+          </a:p>
+          <a:p>
+            <a:pPr lvl="1"/>
+            <a:r>
+              <a:rPr lang="en-US" dirty="0"/>
+              <a:t>But needs other hardware</a:t>
+            </a:r>
+          </a:p>
+          <a:p>
+            <a:endParaRPr lang="en-US" dirty="0"/>
+          </a:p>
+        </p:txBody>
+      </p:sp>
+      <p:sp>
+        <p:nvSpPr>
+          <p:cNvPr id="4" name="Slide Number Placeholder 3">
+            <a:extLst>
+              <a:ext uri="{FF2B5EF4-FFF2-40B4-BE49-F238E27FC236}">
+                <a16:creationId xmlns:a16="http://schemas.microsoft.com/office/drawing/2014/main" id="{D847B470-B464-43B3-A413-C2CE46BC432C}"/>
+              </a:ext>
+            </a:extLst>
+          </p:cNvPr>
+          <p:cNvSpPr>
+            <a:spLocks noGrp="1"/>
+          </p:cNvSpPr>
+          <p:nvPr>
+            <p:ph type="sldNum" sz="quarter" idx="12"/>
+          </p:nvPr>
+        </p:nvSpPr>
+        <p:spPr/>
+        <p:txBody>
+          <a:bodyPr/>
+          <a:lstStyle/>
+          <a:p>
+            <a:fld id="{629637A9-119A-49DA-BD12-AAC58B377D80}" type="slidenum">
+              <a:rPr lang="en-US" smtClean="0"/>
+              <a:t>16</a:t>
+            </a:fld>
+            <a:endParaRPr lang="en-US" dirty="0"/>
+          </a:p>
+        </p:txBody>
+      </p:sp>
+      <p:pic>
+        <p:nvPicPr>
+          <p:cNvPr id="5" name="Picture 2" descr="pluto-sdr">
+            <a:extLst>
+              <a:ext uri="{FF2B5EF4-FFF2-40B4-BE49-F238E27FC236}">
+                <a16:creationId xmlns:a16="http://schemas.microsoft.com/office/drawing/2014/main" id="{FCF0BE0B-59C1-2612-BE26-42F8273C8650}"/>
+              </a:ext>
+            </a:extLst>
+          </p:cNvPr>
+          <p:cNvPicPr>
+            <a:picLocks noChangeAspect="1" noChangeArrowheads="1"/>
+          </p:cNvPicPr>
+          <p:nvPr/>
+        </p:nvPicPr>
+        <p:blipFill>
+          <a:blip r:embed="rId2">
+            <a:extLst>
+              <a:ext uri="{28A0092B-C50C-407E-A947-70E740481C1C}">
+                <a14:useLocalDpi xmlns:a14="http://schemas.microsoft.com/office/drawing/2010/main" val="0"/>
+              </a:ext>
+            </a:extLst>
+          </a:blip>
+          <a:srcRect/>
+          <a:stretch>
+            <a:fillRect/>
+          </a:stretch>
+        </p:blipFill>
+        <p:spPr bwMode="auto">
+          <a:xfrm>
+            <a:off x="6760889" y="1514182"/>
+            <a:ext cx="4204142" cy="1914818"/>
+          </a:xfrm>
+          <a:prstGeom prst="rect">
+            <a:avLst/>
+          </a:prstGeom>
+          <a:noFill/>
+          <a:extLst>
+            <a:ext uri="{909E8E84-426E-40DD-AFC4-6F175D3DCCD1}">
+              <a14:hiddenFill xmlns:a14="http://schemas.microsoft.com/office/drawing/2010/main">
+                <a:solidFill>
+                  <a:srgbClr val="FFFFFF"/>
+                </a:solidFill>
+              </a14:hiddenFill>
+            </a:ext>
+          </a:extLst>
+        </p:spPr>
+      </p:pic>
+      <p:pic>
+        <p:nvPicPr>
+          <p:cNvPr id="6" name="Picture 4" descr="Image result for laptop icon">
+            <a:extLst>
+              <a:ext uri="{FF2B5EF4-FFF2-40B4-BE49-F238E27FC236}">
+                <a16:creationId xmlns:a16="http://schemas.microsoft.com/office/drawing/2014/main" id="{3CB5C352-5C36-DCB5-4086-4CE7399DD551}"/>
+              </a:ext>
+            </a:extLst>
+          </p:cNvPr>
+          <p:cNvPicPr>
+            <a:picLocks noChangeAspect="1" noChangeArrowheads="1"/>
+          </p:cNvPicPr>
+          <p:nvPr/>
+        </p:nvPicPr>
+        <p:blipFill>
+          <a:blip r:embed="rId3">
+            <a:extLst>
+              <a:ext uri="{28A0092B-C50C-407E-A947-70E740481C1C}">
+                <a14:useLocalDpi xmlns:a14="http://schemas.microsoft.com/office/drawing/2010/main" val="0"/>
+              </a:ext>
+            </a:extLst>
+          </a:blip>
+          <a:srcRect/>
+          <a:stretch>
+            <a:fillRect/>
+          </a:stretch>
+        </p:blipFill>
+        <p:spPr bwMode="auto">
+          <a:xfrm>
+            <a:off x="9228441" y="3751580"/>
+            <a:ext cx="1543050" cy="1352550"/>
+          </a:xfrm>
+          <a:prstGeom prst="rect">
+            <a:avLst/>
+          </a:prstGeom>
+          <a:noFill/>
+          <a:extLst>
+            <a:ext uri="{909E8E84-426E-40DD-AFC4-6F175D3DCCD1}">
+              <a14:hiddenFill xmlns:a14="http://schemas.microsoft.com/office/drawing/2010/main">
+                <a:solidFill>
+                  <a:srgbClr val="FFFFFF"/>
+                </a:solidFill>
+              </a14:hiddenFill>
+            </a:ext>
+          </a:extLst>
+        </p:spPr>
+      </p:pic>
+      <p:pic>
+        <p:nvPicPr>
+          <p:cNvPr id="7" name="Picture 8" descr="MATLAB logo and symbol, meaning, history, PNG">
+            <a:extLst>
+              <a:ext uri="{FF2B5EF4-FFF2-40B4-BE49-F238E27FC236}">
+                <a16:creationId xmlns:a16="http://schemas.microsoft.com/office/drawing/2014/main" id="{0B537FF8-BF96-2AF2-EA4C-F905B0363985}"/>
+              </a:ext>
+            </a:extLst>
+          </p:cNvPr>
+          <p:cNvPicPr>
+            <a:picLocks noChangeAspect="1" noChangeArrowheads="1"/>
+          </p:cNvPicPr>
+          <p:nvPr/>
+        </p:nvPicPr>
+        <p:blipFill>
+          <a:blip r:embed="rId4">
+            <a:extLst>
+              <a:ext uri="{28A0092B-C50C-407E-A947-70E740481C1C}">
+                <a14:useLocalDpi xmlns:a14="http://schemas.microsoft.com/office/drawing/2010/main" val="0"/>
+              </a:ext>
+            </a:extLst>
+          </a:blip>
+          <a:srcRect/>
+          <a:stretch>
+            <a:fillRect/>
+          </a:stretch>
+        </p:blipFill>
+        <p:spPr bwMode="auto">
+          <a:xfrm>
+            <a:off x="9007660" y="4829634"/>
+            <a:ext cx="1686990" cy="944715"/>
+          </a:xfrm>
+          <a:prstGeom prst="rect">
+            <a:avLst/>
+          </a:prstGeom>
+          <a:noFill/>
+          <a:extLst>
+            <a:ext uri="{909E8E84-426E-40DD-AFC4-6F175D3DCCD1}">
+              <a14:hiddenFill xmlns:a14="http://schemas.microsoft.com/office/drawing/2010/main">
+                <a:solidFill>
+                  <a:srgbClr val="FFFFFF"/>
+                </a:solidFill>
+              </a14:hiddenFill>
+            </a:ext>
+          </a:extLst>
+        </p:spPr>
+      </p:pic>
+      <p:cxnSp>
+        <p:nvCxnSpPr>
+          <p:cNvPr id="8" name="Straight Connector 7">
+            <a:extLst>
+              <a:ext uri="{FF2B5EF4-FFF2-40B4-BE49-F238E27FC236}">
+                <a16:creationId xmlns:a16="http://schemas.microsoft.com/office/drawing/2014/main" id="{F2C1B8E7-5114-286A-D4B8-8865698C0787}"/>
+              </a:ext>
+            </a:extLst>
+          </p:cNvPr>
+          <p:cNvCxnSpPr/>
+          <p:nvPr/>
+        </p:nvCxnSpPr>
+        <p:spPr>
+          <a:xfrm>
+            <a:off x="10112664" y="3429000"/>
+            <a:ext cx="0" cy="477590"/>
+          </a:xfrm>
+          <a:prstGeom prst="line">
+            <a:avLst/>
+          </a:prstGeom>
+        </p:spPr>
+        <p:style>
+          <a:lnRef idx="1">
+            <a:schemeClr val="accent1"/>
+          </a:lnRef>
+          <a:fillRef idx="0">
+            <a:schemeClr val="accent1"/>
+          </a:fillRef>
+          <a:effectRef idx="0">
+            <a:schemeClr val="accent1"/>
+          </a:effectRef>
+          <a:fontRef idx="minor">
+            <a:schemeClr val="tx1"/>
+          </a:fontRef>
+        </p:style>
+      </p:cxnSp>
+    </p:spTree>
+    <p:extLst>
+      <p:ext uri="{BB962C8B-B14F-4D97-AF65-F5344CB8AC3E}">
+        <p14:creationId xmlns:p14="http://schemas.microsoft.com/office/powerpoint/2010/main" val="96117385"/>
+      </p:ext>
+    </p:extLst>
+  </p:cSld>
+  <p:clrMapOvr>
+    <a:masterClrMapping/>
+  </p:clrMapOvr>
+</p:sld>
+</file>
+
+<file path=ppt/slides/slide17.xml><?xml version="1.0" encoding="utf-8"?>
 <p:sld xmlns:a="http://schemas.openxmlformats.org/drawingml/2006/main" xmlns:r="http://schemas.openxmlformats.org/officeDocument/2006/relationships" xmlns:p="http://schemas.openxmlformats.org/presentationml/2006/main">
   <p:cSld>
     <p:spTree>
@@ -7551,7 +8174,7 @@
             <a:fld id="{529F9F8D-2534-4D48-85E3-73908409BCC5}" type="slidenum">
               <a:rPr lang="en-US" smtClean="0"/>
               <a:pPr/>
-              <a:t>15</a:t>
+              <a:t>17</a:t>
             </a:fld>
             <a:endParaRPr lang="en-US"/>
           </a:p>
@@ -7651,7 +8274,7 @@
 </p:sld>
 </file>
 
-<file path=ppt/slides/slide16.xml><?xml version="1.0" encoding="utf-8"?>
+<file path=ppt/slides/slide18.xml><?xml version="1.0" encoding="utf-8"?>
 <p:sld xmlns:a="http://schemas.openxmlformats.org/drawingml/2006/main" xmlns:r="http://schemas.openxmlformats.org/officeDocument/2006/relationships" xmlns:p="http://schemas.openxmlformats.org/presentationml/2006/main">
   <p:cSld>
     <p:spTree>
@@ -7814,7 +8437,7 @@
           <a:p>
             <a:fld id="{629637A9-119A-49DA-BD12-AAC58B377D80}" type="slidenum">
               <a:rPr lang="en-US" smtClean="0"/>
-              <a:t>16</a:t>
+              <a:t>18</a:t>
             </a:fld>
             <a:endParaRPr lang="en-US" dirty="0"/>
           </a:p>
@@ -7833,7 +8456,7 @@
 </p:sld>
 </file>
 
-<file path=ppt/slides/slide17.xml><?xml version="1.0" encoding="utf-8"?>
+<file path=ppt/slides/slide19.xml><?xml version="1.0" encoding="utf-8"?>
 <p:sld xmlns:a="http://schemas.openxmlformats.org/drawingml/2006/main" xmlns:r="http://schemas.openxmlformats.org/officeDocument/2006/relationships" xmlns:p="http://schemas.openxmlformats.org/presentationml/2006/main">
   <p:cSld>
     <p:spTree>
@@ -8078,7 +8701,7 @@
           <a:p>
             <a:fld id="{629637A9-119A-49DA-BD12-AAC58B377D80}" type="slidenum">
               <a:rPr lang="en-US" smtClean="0"/>
-              <a:t>17</a:t>
+              <a:t>19</a:t>
             </a:fld>
             <a:endParaRPr lang="en-US" dirty="0"/>
           </a:p>
@@ -8097,7 +8720,215 @@
 </p:sld>
 </file>
 
-<file path=ppt/slides/slide18.xml><?xml version="1.0" encoding="utf-8"?>
+<file path=ppt/slides/slide2.xml><?xml version="1.0" encoding="utf-8"?>
+<p:sld xmlns:a="http://schemas.openxmlformats.org/drawingml/2006/main" xmlns:r="http://schemas.openxmlformats.org/officeDocument/2006/relationships" xmlns:p="http://schemas.openxmlformats.org/presentationml/2006/main">
+  <p:cSld>
+    <p:spTree>
+      <p:nvGrpSpPr>
+        <p:cNvPr id="1" name=""/>
+        <p:cNvGrpSpPr/>
+        <p:nvPr/>
+      </p:nvGrpSpPr>
+      <p:grpSpPr>
+        <a:xfrm>
+          <a:off x="0" y="0"/>
+          <a:ext cx="0" cy="0"/>
+          <a:chOff x="0" y="0"/>
+          <a:chExt cx="0" cy="0"/>
+        </a:xfrm>
+      </p:grpSpPr>
+      <p:sp>
+        <p:nvSpPr>
+          <p:cNvPr id="2" name="Title 1">
+            <a:extLst>
+              <a:ext uri="{FF2B5EF4-FFF2-40B4-BE49-F238E27FC236}">
+                <a16:creationId xmlns:a16="http://schemas.microsoft.com/office/drawing/2014/main" id="{F4ED086D-1C9A-4B43-9F22-05E00BC8D6E8}"/>
+              </a:ext>
+            </a:extLst>
+          </p:cNvPr>
+          <p:cNvSpPr>
+            <a:spLocks noGrp="1"/>
+          </p:cNvSpPr>
+          <p:nvPr>
+            <p:ph type="title"/>
+          </p:nvPr>
+        </p:nvSpPr>
+        <p:spPr/>
+        <p:txBody>
+          <a:bodyPr/>
+          <a:lstStyle/>
+          <a:p>
+            <a:r>
+              <a:rPr lang="en-US" dirty="0"/>
+              <a:t>People and Time	</a:t>
+            </a:r>
+          </a:p>
+        </p:txBody>
+      </p:sp>
+      <p:sp>
+        <p:nvSpPr>
+          <p:cNvPr id="3" name="Content Placeholder 2">
+            <a:extLst>
+              <a:ext uri="{FF2B5EF4-FFF2-40B4-BE49-F238E27FC236}">
+                <a16:creationId xmlns:a16="http://schemas.microsoft.com/office/drawing/2014/main" id="{77F0C1C5-E5D1-4EB5-B957-5E2EEDD7ABE2}"/>
+              </a:ext>
+            </a:extLst>
+          </p:cNvPr>
+          <p:cNvSpPr>
+            <a:spLocks noGrp="1"/>
+          </p:cNvSpPr>
+          <p:nvPr>
+            <p:ph idx="1"/>
+          </p:nvPr>
+        </p:nvSpPr>
+        <p:spPr/>
+        <p:txBody>
+          <a:bodyPr/>
+          <a:lstStyle/>
+          <a:p>
+            <a:r>
+              <a:rPr lang="en-US" dirty="0"/>
+              <a:t>Professor: Sundeep Rangan, </a:t>
+            </a:r>
+            <a:r>
+              <a:rPr lang="en-US" dirty="0">
+                <a:hlinkClick r:id="rId2"/>
+              </a:rPr>
+              <a:t>srangan@nyu.edu</a:t>
+            </a:r>
+            <a:r>
+              <a:rPr lang="en-US" dirty="0"/>
+              <a:t> </a:t>
+            </a:r>
+          </a:p>
+          <a:p>
+            <a:pPr lvl="1"/>
+            <a:r>
+              <a:rPr lang="en-US" dirty="0"/>
+              <a:t>Office Hours:  Mondays  3-4pm</a:t>
+            </a:r>
+          </a:p>
+          <a:p>
+            <a:r>
+              <a:rPr lang="de-DE" dirty="0"/>
+              <a:t>Course Assitant:  </a:t>
+            </a:r>
+            <a:r>
+              <a:rPr lang="en-US" sz="1800" dirty="0">
+                <a:effectLst/>
+                <a:latin typeface="Calibri" panose="020F0502020204030204" pitchFamily="34" charset="0"/>
+                <a:ea typeface="Times New Roman" panose="02020603050405020304" pitchFamily="18" charset="0"/>
+                <a:cs typeface="Times New Roman" panose="02020603050405020304" pitchFamily="18" charset="0"/>
+              </a:rPr>
+              <a:t>TBD</a:t>
+            </a:r>
+            <a:endParaRPr lang="de-DE" dirty="0"/>
+          </a:p>
+          <a:p>
+            <a:pPr lvl="1"/>
+            <a:r>
+              <a:rPr lang="de-DE" dirty="0"/>
+              <a:t>Ask for all questions regarding homeworks and labs</a:t>
+            </a:r>
+          </a:p>
+          <a:p>
+            <a:r>
+              <a:rPr lang="de-DE" dirty="0"/>
+              <a:t>Class time:  Tuesdays 11 to 1:30pm, 2 Metrotech Room 811</a:t>
+            </a:r>
+          </a:p>
+          <a:p>
+            <a:pPr lvl="1"/>
+            <a:r>
+              <a:rPr lang="de-DE" dirty="0"/>
+              <a:t>I will try to also broadcast on Zoom for those unable to attend</a:t>
+            </a:r>
+          </a:p>
+          <a:p>
+            <a:pPr lvl="1"/>
+            <a:r>
+              <a:rPr lang="de-DE" dirty="0"/>
+              <a:t>Attendance is optional</a:t>
+            </a:r>
+          </a:p>
+          <a:p>
+            <a:pPr lvl="1"/>
+            <a:r>
+              <a:rPr lang="de-DE" dirty="0"/>
+              <a:t>Lectures and problems</a:t>
+            </a:r>
+          </a:p>
+          <a:p>
+            <a:r>
+              <a:rPr lang="de-DE" dirty="0"/>
+              <a:t>Online lectures from previous year available on YouTube.</a:t>
+            </a:r>
+          </a:p>
+          <a:p>
+            <a:pPr lvl="1"/>
+            <a:r>
+              <a:rPr lang="de-DE" dirty="0">
+                <a:hlinkClick r:id="rId3"/>
+              </a:rPr>
+              <a:t>YouTube Wireless comm playlist</a:t>
+            </a:r>
+            <a:r>
+              <a:rPr lang="de-DE" dirty="0"/>
+              <a:t> </a:t>
+            </a:r>
+          </a:p>
+          <a:p>
+            <a:pPr lvl="1"/>
+            <a:r>
+              <a:rPr lang="de-DE" dirty="0"/>
+              <a:t>I may add / modify these, this semester</a:t>
+            </a:r>
+          </a:p>
+        </p:txBody>
+      </p:sp>
+      <p:sp>
+        <p:nvSpPr>
+          <p:cNvPr id="4" name="Slide Number Placeholder 3">
+            <a:extLst>
+              <a:ext uri="{FF2B5EF4-FFF2-40B4-BE49-F238E27FC236}">
+                <a16:creationId xmlns:a16="http://schemas.microsoft.com/office/drawing/2014/main" id="{19B69252-709C-4E31-A546-A53DAAEF3F58}"/>
+              </a:ext>
+            </a:extLst>
+          </p:cNvPr>
+          <p:cNvSpPr>
+            <a:spLocks noGrp="1"/>
+          </p:cNvSpPr>
+          <p:nvPr>
+            <p:ph type="sldNum" sz="quarter" idx="12"/>
+          </p:nvPr>
+        </p:nvSpPr>
+        <p:spPr/>
+        <p:txBody>
+          <a:bodyPr/>
+          <a:lstStyle/>
+          <a:p>
+            <a:fld id="{629637A9-119A-49DA-BD12-AAC58B377D80}" type="slidenum">
+              <a:rPr lang="en-US" smtClean="0"/>
+              <a:t>2</a:t>
+            </a:fld>
+            <a:endParaRPr lang="en-US" dirty="0"/>
+          </a:p>
+        </p:txBody>
+      </p:sp>
+    </p:spTree>
+    <p:extLst>
+      <p:ext uri="{BB962C8B-B14F-4D97-AF65-F5344CB8AC3E}">
+        <p14:creationId xmlns:p14="http://schemas.microsoft.com/office/powerpoint/2010/main" val="3947274602"/>
+      </p:ext>
+    </p:extLst>
+  </p:cSld>
+  <p:clrMapOvr>
+    <a:masterClrMapping/>
+  </p:clrMapOvr>
+</p:sld>
+</file>
+
+<file path=ppt/slides/slide20.xml><?xml version="1.0" encoding="utf-8"?>
 <p:sld xmlns:a="http://schemas.openxmlformats.org/drawingml/2006/main" xmlns:r="http://schemas.openxmlformats.org/officeDocument/2006/relationships" xmlns:p="http://schemas.openxmlformats.org/presentationml/2006/main">
   <p:cSld>
     <p:spTree>
@@ -8255,7 +9086,7 @@
           <a:p>
             <a:fld id="{629637A9-119A-49DA-BD12-AAC58B377D80}" type="slidenum">
               <a:rPr lang="en-US" smtClean="0"/>
-              <a:t>18</a:t>
+              <a:t>20</a:t>
             </a:fld>
             <a:endParaRPr lang="en-US" dirty="0"/>
           </a:p>
@@ -8359,245 +9190,6 @@
     <p:extLst>
       <p:ext uri="{BB962C8B-B14F-4D97-AF65-F5344CB8AC3E}">
         <p14:creationId xmlns:p14="http://schemas.microsoft.com/office/powerpoint/2010/main" val="137241302"/>
-      </p:ext>
-    </p:extLst>
-  </p:cSld>
-  <p:clrMapOvr>
-    <a:masterClrMapping/>
-  </p:clrMapOvr>
-</p:sld>
-</file>
-
-<file path=ppt/slides/slide2.xml><?xml version="1.0" encoding="utf-8"?>
-<p:sld xmlns:a="http://schemas.openxmlformats.org/drawingml/2006/main" xmlns:r="http://schemas.openxmlformats.org/officeDocument/2006/relationships" xmlns:p="http://schemas.openxmlformats.org/presentationml/2006/main">
-  <p:cSld>
-    <p:spTree>
-      <p:nvGrpSpPr>
-        <p:cNvPr id="1" name=""/>
-        <p:cNvGrpSpPr/>
-        <p:nvPr/>
-      </p:nvGrpSpPr>
-      <p:grpSpPr>
-        <a:xfrm>
-          <a:off x="0" y="0"/>
-          <a:ext cx="0" cy="0"/>
-          <a:chOff x="0" y="0"/>
-          <a:chExt cx="0" cy="0"/>
-        </a:xfrm>
-      </p:grpSpPr>
-      <p:sp>
-        <p:nvSpPr>
-          <p:cNvPr id="2" name="Title 1">
-            <a:extLst>
-              <a:ext uri="{FF2B5EF4-FFF2-40B4-BE49-F238E27FC236}">
-                <a16:creationId xmlns:a16="http://schemas.microsoft.com/office/drawing/2014/main" id="{F4ED086D-1C9A-4B43-9F22-05E00BC8D6E8}"/>
-              </a:ext>
-            </a:extLst>
-          </p:cNvPr>
-          <p:cNvSpPr>
-            <a:spLocks noGrp="1"/>
-          </p:cNvSpPr>
-          <p:nvPr>
-            <p:ph type="title"/>
-          </p:nvPr>
-        </p:nvSpPr>
-        <p:spPr/>
-        <p:txBody>
-          <a:bodyPr/>
-          <a:lstStyle/>
-          <a:p>
-            <a:r>
-              <a:rPr lang="en-US" dirty="0"/>
-              <a:t>People and Time	</a:t>
-            </a:r>
-          </a:p>
-        </p:txBody>
-      </p:sp>
-      <p:sp>
-        <p:nvSpPr>
-          <p:cNvPr id="3" name="Content Placeholder 2">
-            <a:extLst>
-              <a:ext uri="{FF2B5EF4-FFF2-40B4-BE49-F238E27FC236}">
-                <a16:creationId xmlns:a16="http://schemas.microsoft.com/office/drawing/2014/main" id="{77F0C1C5-E5D1-4EB5-B957-5E2EEDD7ABE2}"/>
-              </a:ext>
-            </a:extLst>
-          </p:cNvPr>
-          <p:cNvSpPr>
-            <a:spLocks noGrp="1"/>
-          </p:cNvSpPr>
-          <p:nvPr>
-            <p:ph idx="1"/>
-          </p:nvPr>
-        </p:nvSpPr>
-        <p:spPr/>
-        <p:txBody>
-          <a:bodyPr/>
-          <a:lstStyle/>
-          <a:p>
-            <a:r>
-              <a:rPr lang="en-US" dirty="0"/>
-              <a:t>Professor: Sundeep Rangan, </a:t>
-            </a:r>
-            <a:r>
-              <a:rPr lang="en-US" dirty="0">
-                <a:hlinkClick r:id="rId2"/>
-              </a:rPr>
-              <a:t>srangan@nyu.edu</a:t>
-            </a:r>
-            <a:r>
-              <a:rPr lang="en-US" dirty="0"/>
-              <a:t> </a:t>
-            </a:r>
-          </a:p>
-          <a:p>
-            <a:pPr lvl="1"/>
-            <a:r>
-              <a:rPr lang="en-US" dirty="0"/>
-              <a:t>Office Hours:  Mondays  11am-12pm</a:t>
-            </a:r>
-          </a:p>
-          <a:p>
-            <a:r>
-              <a:rPr lang="de-DE" dirty="0"/>
-              <a:t>Course Assitant:  </a:t>
-            </a:r>
-            <a:r>
-              <a:rPr lang="en-US" sz="1800" dirty="0">
-                <a:effectLst/>
-                <a:latin typeface="Calibri" panose="020F0502020204030204" pitchFamily="34" charset="0"/>
-                <a:ea typeface="Times New Roman" panose="02020603050405020304" pitchFamily="18" charset="0"/>
-                <a:cs typeface="Times New Roman" panose="02020603050405020304" pitchFamily="18" charset="0"/>
-              </a:rPr>
-              <a:t>Panagiotis </a:t>
-            </a:r>
-            <a:r>
-              <a:rPr lang="en-US" sz="1800" dirty="0" err="1">
-                <a:effectLst/>
-                <a:latin typeface="Calibri" panose="020F0502020204030204" pitchFamily="34" charset="0"/>
-                <a:ea typeface="Times New Roman" panose="02020603050405020304" pitchFamily="18" charset="0"/>
-                <a:cs typeface="Times New Roman" panose="02020603050405020304" pitchFamily="18" charset="0"/>
-              </a:rPr>
-              <a:t>Skrimponis</a:t>
-            </a:r>
-            <a:r>
-              <a:rPr lang="en-US" sz="1800" dirty="0">
-                <a:effectLst/>
-                <a:latin typeface="Calibri" panose="020F0502020204030204" pitchFamily="34" charset="0"/>
-                <a:ea typeface="Times New Roman" panose="02020603050405020304" pitchFamily="18" charset="0"/>
-                <a:cs typeface="Times New Roman" panose="02020603050405020304" pitchFamily="18" charset="0"/>
-              </a:rPr>
-              <a:t>, </a:t>
-            </a:r>
-            <a:r>
-              <a:rPr lang="en-US" sz="1800" u="sng" dirty="0">
-                <a:solidFill>
-                  <a:srgbClr val="0000FF"/>
-                </a:solidFill>
-                <a:effectLst/>
-                <a:latin typeface="Calibri" panose="020F0502020204030204" pitchFamily="34" charset="0"/>
-                <a:ea typeface="Times New Roman" panose="02020603050405020304" pitchFamily="18" charset="0"/>
-                <a:cs typeface="Times New Roman" panose="02020603050405020304" pitchFamily="18" charset="0"/>
-                <a:hlinkClick r:id="rId3"/>
-              </a:rPr>
-              <a:t>pa3857@nyu.edu</a:t>
-            </a:r>
-            <a:endParaRPr lang="de-DE" dirty="0"/>
-          </a:p>
-          <a:p>
-            <a:pPr lvl="1"/>
-            <a:r>
-              <a:rPr lang="de-DE" dirty="0"/>
-              <a:t>Ask for all questions regarding homeworks and labs</a:t>
-            </a:r>
-          </a:p>
-          <a:p>
-            <a:r>
-              <a:rPr lang="de-DE" dirty="0"/>
-              <a:t>Class time:  Tuesdays 11 to 1:30pm, RH 213</a:t>
-            </a:r>
-          </a:p>
-          <a:p>
-            <a:pPr lvl="1"/>
-            <a:r>
-              <a:rPr lang="de-DE" dirty="0"/>
-              <a:t>I will try to also broadcast on Zoom for those unable to attend</a:t>
-            </a:r>
-          </a:p>
-          <a:p>
-            <a:pPr lvl="1"/>
-            <a:r>
-              <a:rPr lang="de-DE" dirty="0"/>
-              <a:t>Attendance is optional</a:t>
-            </a:r>
-          </a:p>
-          <a:p>
-            <a:pPr lvl="1"/>
-            <a:r>
-              <a:rPr lang="de-DE" dirty="0"/>
-              <a:t>Lectures and problems</a:t>
-            </a:r>
-          </a:p>
-          <a:p>
-            <a:r>
-              <a:rPr lang="de-DE" dirty="0"/>
-              <a:t>Online lectures from previous year available on YouTube.</a:t>
-            </a:r>
-          </a:p>
-          <a:p>
-            <a:pPr lvl="1"/>
-            <a:r>
-              <a:rPr lang="de-DE" dirty="0">
-                <a:hlinkClick r:id="rId4"/>
-              </a:rPr>
-              <a:t>YouTube Wireless comm playlist</a:t>
-            </a:r>
-            <a:r>
-              <a:rPr lang="de-DE" dirty="0"/>
-              <a:t> </a:t>
-            </a:r>
-          </a:p>
-          <a:p>
-            <a:pPr lvl="1"/>
-            <a:r>
-              <a:rPr lang="de-DE" dirty="0"/>
-              <a:t>I may add / modify these, this semester</a:t>
-            </a:r>
-          </a:p>
-        </p:txBody>
-      </p:sp>
-      <p:sp>
-        <p:nvSpPr>
-          <p:cNvPr id="4" name="Slide Number Placeholder 3">
-            <a:extLst>
-              <a:ext uri="{FF2B5EF4-FFF2-40B4-BE49-F238E27FC236}">
-                <a16:creationId xmlns:a16="http://schemas.microsoft.com/office/drawing/2014/main" id="{19B69252-709C-4E31-A546-A53DAAEF3F58}"/>
-              </a:ext>
-            </a:extLst>
-          </p:cNvPr>
-          <p:cNvSpPr>
-            <a:spLocks noGrp="1"/>
-          </p:cNvSpPr>
-          <p:nvPr>
-            <p:ph type="sldNum" sz="quarter" idx="12"/>
-          </p:nvPr>
-        </p:nvSpPr>
-        <p:spPr/>
-        <p:txBody>
-          <a:bodyPr/>
-          <a:lstStyle/>
-          <a:p>
-            <a:fld id="{629637A9-119A-49DA-BD12-AAC58B377D80}" type="slidenum">
-              <a:rPr lang="en-US" smtClean="0"/>
-              <a:t>2</a:t>
-            </a:fld>
-            <a:endParaRPr lang="en-US" dirty="0"/>
-          </a:p>
-        </p:txBody>
-      </p:sp>
-    </p:spTree>
-    <p:extLst>
-      <p:ext uri="{BB962C8B-B14F-4D97-AF65-F5344CB8AC3E}">
-        <p14:creationId xmlns:p14="http://schemas.microsoft.com/office/powerpoint/2010/main" val="3947274602"/>
       </p:ext>
     </p:extLst>
   </p:cSld>

</xml_diff>

<commit_message>
Added material on polarization
</commit_message>
<xml_diff>
--- a/lectures/CourseAdmin.pptx
+++ b/lectures/CourseAdmin.pptx
@@ -5,7 +5,7 @@
     <p:sldMasterId id="2147483648" r:id="rId1"/>
   </p:sldMasterIdLst>
   <p:notesMasterIdLst>
-    <p:notesMasterId r:id="rId22"/>
+    <p:notesMasterId r:id="rId23"/>
   </p:notesMasterIdLst>
   <p:sldIdLst>
     <p:sldId id="258" r:id="rId2"/>
@@ -24,10 +24,11 @@
     <p:sldId id="406" r:id="rId15"/>
     <p:sldId id="419" r:id="rId16"/>
     <p:sldId id="803" r:id="rId17"/>
-    <p:sldId id="400" r:id="rId18"/>
-    <p:sldId id="802" r:id="rId19"/>
-    <p:sldId id="272" r:id="rId20"/>
-    <p:sldId id="411" r:id="rId21"/>
+    <p:sldId id="805" r:id="rId18"/>
+    <p:sldId id="400" r:id="rId19"/>
+    <p:sldId id="802" r:id="rId20"/>
+    <p:sldId id="272" r:id="rId21"/>
+    <p:sldId id="411" r:id="rId22"/>
   </p:sldIdLst>
   <p:sldSz cx="12192000" cy="6858000"/>
   <p:notesSz cx="7315200" cy="9601200"/>
@@ -227,7 +228,7 @@
           <a:p>
             <a:fld id="{B7D6DDD3-D7E9-488B-B626-1E8285E424D8}" type="datetimeFigureOut">
               <a:rPr lang="en-US" smtClean="0"/>
-              <a:t>1/24/2024</a:t>
+              <a:t>1/21/2025</a:t>
             </a:fld>
             <a:endParaRPr lang="en-US"/>
           </a:p>
@@ -8136,6 +8137,313 @@
       </p:grpSpPr>
       <p:sp>
         <p:nvSpPr>
+          <p:cNvPr id="2" name="Title 1">
+            <a:extLst>
+              <a:ext uri="{FF2B5EF4-FFF2-40B4-BE49-F238E27FC236}">
+                <a16:creationId xmlns:a16="http://schemas.microsoft.com/office/drawing/2014/main" id="{E60BFF63-51AF-4C37-A589-0EAC1620C447}"/>
+              </a:ext>
+            </a:extLst>
+          </p:cNvPr>
+          <p:cNvSpPr>
+            <a:spLocks noGrp="1"/>
+          </p:cNvSpPr>
+          <p:nvPr>
+            <p:ph type="title"/>
+          </p:nvPr>
+        </p:nvSpPr>
+        <p:spPr/>
+        <p:txBody>
+          <a:bodyPr/>
+          <a:lstStyle/>
+          <a:p>
+            <a:r>
+              <a:rPr lang="en-US" dirty="0"/>
+              <a:t>Nvidia </a:t>
+            </a:r>
+            <a:r>
+              <a:rPr lang="en-US" dirty="0" err="1"/>
+              <a:t>Sionna</a:t>
+            </a:r>
+            <a:endParaRPr lang="en-US" dirty="0"/>
+          </a:p>
+        </p:txBody>
+      </p:sp>
+      <p:sp>
+        <p:nvSpPr>
+          <p:cNvPr id="3" name="Content Placeholder 2">
+            <a:extLst>
+              <a:ext uri="{FF2B5EF4-FFF2-40B4-BE49-F238E27FC236}">
+                <a16:creationId xmlns:a16="http://schemas.microsoft.com/office/drawing/2014/main" id="{262F4DA1-30B2-44EF-D331-5CAC21CF9E4F}"/>
+              </a:ext>
+            </a:extLst>
+          </p:cNvPr>
+          <p:cNvSpPr>
+            <a:spLocks noGrp="1"/>
+          </p:cNvSpPr>
+          <p:nvPr>
+            <p:ph idx="1"/>
+          </p:nvPr>
+        </p:nvSpPr>
+        <p:spPr/>
+        <p:txBody>
+          <a:bodyPr>
+            <a:normAutofit fontScale="92500" lnSpcReduction="20000"/>
+          </a:bodyPr>
+          <a:lstStyle/>
+          <a:p>
+            <a:r>
+              <a:rPr lang="en-US" dirty="0" err="1"/>
+              <a:t>Sionna</a:t>
+            </a:r>
+            <a:r>
+              <a:rPr lang="en-US" dirty="0"/>
+              <a:t>  </a:t>
+            </a:r>
+            <a:r>
+              <a:rPr lang="en-US" dirty="0">
+                <a:hlinkClick r:id="rId2"/>
+              </a:rPr>
+              <a:t>https://nvlabs.github.io/sionna/</a:t>
+            </a:r>
+            <a:endParaRPr lang="en-US" dirty="0"/>
+          </a:p>
+          <a:p>
+            <a:r>
+              <a:rPr lang="en-US" dirty="0"/>
+              <a:t>Nvidia PHY layer simulation tool</a:t>
+            </a:r>
+          </a:p>
+          <a:p>
+            <a:r>
+              <a:rPr lang="en-US" dirty="0"/>
+              <a:t>Native integration in </a:t>
+            </a:r>
+            <a:r>
+              <a:rPr lang="en-US" dirty="0" err="1"/>
+              <a:t>Tensorflow</a:t>
+            </a:r>
+            <a:endParaRPr lang="en-US" dirty="0"/>
+          </a:p>
+          <a:p>
+            <a:pPr lvl="1"/>
+            <a:r>
+              <a:rPr lang="en-US" dirty="0"/>
+              <a:t>Excellent for projects with ML</a:t>
+            </a:r>
+          </a:p>
+          <a:p>
+            <a:r>
+              <a:rPr lang="en-US" dirty="0"/>
+              <a:t>Full python based</a:t>
+            </a:r>
+          </a:p>
+          <a:p>
+            <a:pPr lvl="1"/>
+            <a:r>
+              <a:rPr lang="en-US" dirty="0"/>
+              <a:t>Can be run in Google </a:t>
+            </a:r>
+            <a:r>
+              <a:rPr lang="en-US" dirty="0" err="1"/>
+              <a:t>colab</a:t>
+            </a:r>
+            <a:endParaRPr lang="en-US" dirty="0"/>
+          </a:p>
+          <a:p>
+            <a:r>
+              <a:rPr lang="en-US" dirty="0"/>
+              <a:t>Complete integration with ray tracing</a:t>
+            </a:r>
+          </a:p>
+          <a:p>
+            <a:r>
+              <a:rPr lang="en-US" dirty="0"/>
+              <a:t>Many comms functions</a:t>
+            </a:r>
+          </a:p>
+          <a:p>
+            <a:pPr lvl="1"/>
+            <a:r>
+              <a:rPr lang="en-US" dirty="0"/>
+              <a:t>Basic antennas, channels, modulation, coding</a:t>
+            </a:r>
+          </a:p>
+          <a:p>
+            <a:pPr lvl="1"/>
+            <a:r>
+              <a:rPr lang="en-US" dirty="0"/>
+              <a:t>Some 5G methods</a:t>
+            </a:r>
+          </a:p>
+          <a:p>
+            <a:r>
+              <a:rPr lang="en-US" dirty="0"/>
+              <a:t>Not as extensive as MATLAB’s Toolbox</a:t>
+            </a:r>
+          </a:p>
+          <a:p>
+            <a:r>
+              <a:rPr lang="en-US" dirty="0"/>
+              <a:t>I will move some labs to </a:t>
+            </a:r>
+            <a:r>
+              <a:rPr lang="en-US" dirty="0" err="1"/>
+              <a:t>sionna</a:t>
+            </a:r>
+            <a:r>
+              <a:rPr lang="en-US" dirty="0"/>
+              <a:t> </a:t>
+            </a:r>
+          </a:p>
+          <a:p>
+            <a:endParaRPr lang="en-US" dirty="0"/>
+          </a:p>
+          <a:p>
+            <a:endParaRPr lang="en-US" dirty="0"/>
+          </a:p>
+          <a:p>
+            <a:endParaRPr lang="en-US" dirty="0"/>
+          </a:p>
+        </p:txBody>
+      </p:sp>
+      <p:sp>
+        <p:nvSpPr>
+          <p:cNvPr id="4" name="Slide Number Placeholder 3">
+            <a:extLst>
+              <a:ext uri="{FF2B5EF4-FFF2-40B4-BE49-F238E27FC236}">
+                <a16:creationId xmlns:a16="http://schemas.microsoft.com/office/drawing/2014/main" id="{36D07E26-099D-5128-5D20-383E376D06DD}"/>
+              </a:ext>
+            </a:extLst>
+          </p:cNvPr>
+          <p:cNvSpPr>
+            <a:spLocks noGrp="1"/>
+          </p:cNvSpPr>
+          <p:nvPr>
+            <p:ph type="sldNum" sz="quarter" idx="12"/>
+          </p:nvPr>
+        </p:nvSpPr>
+        <p:spPr/>
+        <p:txBody>
+          <a:bodyPr/>
+          <a:lstStyle/>
+          <a:p>
+            <a:fld id="{629637A9-119A-49DA-BD12-AAC58B377D80}" type="slidenum">
+              <a:rPr lang="en-US" smtClean="0"/>
+              <a:t>17</a:t>
+            </a:fld>
+            <a:endParaRPr lang="en-US" dirty="0"/>
+          </a:p>
+        </p:txBody>
+      </p:sp>
+      <p:pic>
+        <p:nvPicPr>
+          <p:cNvPr id="1026" name="Picture 2" descr="Introduction to Sionna RT — Sionna 0 ...">
+            <a:extLst>
+              <a:ext uri="{FF2B5EF4-FFF2-40B4-BE49-F238E27FC236}">
+                <a16:creationId xmlns:a16="http://schemas.microsoft.com/office/drawing/2014/main" id="{0F0BA627-4D35-C463-5E23-6C5B95022E16}"/>
+              </a:ext>
+            </a:extLst>
+          </p:cNvPr>
+          <p:cNvPicPr>
+            <a:picLocks noChangeAspect="1" noChangeArrowheads="1"/>
+          </p:cNvPicPr>
+          <p:nvPr/>
+        </p:nvPicPr>
+        <p:blipFill>
+          <a:blip r:embed="rId3">
+            <a:extLst>
+              <a:ext uri="{28A0092B-C50C-407E-A947-70E740481C1C}">
+                <a14:useLocalDpi xmlns:a14="http://schemas.microsoft.com/office/drawing/2010/main" val="0"/>
+              </a:ext>
+            </a:extLst>
+          </a:blip>
+          <a:srcRect/>
+          <a:stretch>
+            <a:fillRect/>
+          </a:stretch>
+        </p:blipFill>
+        <p:spPr bwMode="auto">
+          <a:xfrm>
+            <a:off x="8460105" y="479089"/>
+            <a:ext cx="2695575" cy="1695450"/>
+          </a:xfrm>
+          <a:prstGeom prst="rect">
+            <a:avLst/>
+          </a:prstGeom>
+          <a:noFill/>
+          <a:extLst>
+            <a:ext uri="{909E8E84-426E-40DD-AFC4-6F175D3DCCD1}">
+              <a14:hiddenFill xmlns:a14="http://schemas.microsoft.com/office/drawing/2010/main">
+                <a:solidFill>
+                  <a:srgbClr val="FFFFFF"/>
+                </a:solidFill>
+              </a14:hiddenFill>
+            </a:ext>
+          </a:extLst>
+        </p:spPr>
+      </p:pic>
+      <p:pic>
+        <p:nvPicPr>
+          <p:cNvPr id="6" name="Picture 5">
+            <a:extLst>
+              <a:ext uri="{FF2B5EF4-FFF2-40B4-BE49-F238E27FC236}">
+                <a16:creationId xmlns:a16="http://schemas.microsoft.com/office/drawing/2014/main" id="{ACC5C9C5-B42E-06A4-B6BF-ADFB22DF4059}"/>
+              </a:ext>
+            </a:extLst>
+          </p:cNvPr>
+          <p:cNvPicPr>
+            <a:picLocks noChangeAspect="1"/>
+          </p:cNvPicPr>
+          <p:nvPr/>
+        </p:nvPicPr>
+        <p:blipFill>
+          <a:blip r:embed="rId4"/>
+          <a:stretch>
+            <a:fillRect/>
+          </a:stretch>
+        </p:blipFill>
+        <p:spPr>
+          <a:xfrm>
+            <a:off x="6767605" y="2387002"/>
+            <a:ext cx="4877481" cy="3200847"/>
+          </a:xfrm>
+          <a:prstGeom prst="rect">
+            <a:avLst/>
+          </a:prstGeom>
+        </p:spPr>
+      </p:pic>
+    </p:spTree>
+    <p:extLst>
+      <p:ext uri="{BB962C8B-B14F-4D97-AF65-F5344CB8AC3E}">
+        <p14:creationId xmlns:p14="http://schemas.microsoft.com/office/powerpoint/2010/main" val="2757498183"/>
+      </p:ext>
+    </p:extLst>
+  </p:cSld>
+  <p:clrMapOvr>
+    <a:masterClrMapping/>
+  </p:clrMapOvr>
+</p:sld>
+</file>
+
+<file path=ppt/slides/slide18.xml><?xml version="1.0" encoding="utf-8"?>
+<p:sld xmlns:a="http://schemas.openxmlformats.org/drawingml/2006/main" xmlns:r="http://schemas.openxmlformats.org/officeDocument/2006/relationships" xmlns:p="http://schemas.openxmlformats.org/presentationml/2006/main">
+  <p:cSld>
+    <p:spTree>
+      <p:nvGrpSpPr>
+        <p:cNvPr id="1" name=""/>
+        <p:cNvGrpSpPr/>
+        <p:nvPr/>
+      </p:nvGrpSpPr>
+      <p:grpSpPr>
+        <a:xfrm>
+          <a:off x="0" y="0"/>
+          <a:ext cx="0" cy="0"/>
+          <a:chOff x="0" y="0"/>
+          <a:chExt cx="0" cy="0"/>
+        </a:xfrm>
+      </p:grpSpPr>
+      <p:sp>
+        <p:nvSpPr>
           <p:cNvPr id="2" name="Title 1"/>
           <p:cNvSpPr>
             <a:spLocks noGrp="1"/>
@@ -8174,7 +8482,7 @@
             <a:fld id="{529F9F8D-2534-4D48-85E3-73908409BCC5}" type="slidenum">
               <a:rPr lang="en-US" smtClean="0"/>
               <a:pPr/>
-              <a:t>17</a:t>
+              <a:t>18</a:t>
             </a:fld>
             <a:endParaRPr lang="en-US"/>
           </a:p>
@@ -8274,7 +8582,7 @@
 </p:sld>
 </file>
 
-<file path=ppt/slides/slide18.xml><?xml version="1.0" encoding="utf-8"?>
+<file path=ppt/slides/slide19.xml><?xml version="1.0" encoding="utf-8"?>
 <p:sld xmlns:a="http://schemas.openxmlformats.org/drawingml/2006/main" xmlns:r="http://schemas.openxmlformats.org/officeDocument/2006/relationships" xmlns:p="http://schemas.openxmlformats.org/presentationml/2006/main">
   <p:cSld>
     <p:spTree>
@@ -8437,7 +8745,7 @@
           <a:p>
             <a:fld id="{629637A9-119A-49DA-BD12-AAC58B377D80}" type="slidenum">
               <a:rPr lang="en-US" smtClean="0"/>
-              <a:t>18</a:t>
+              <a:t>19</a:t>
             </a:fld>
             <a:endParaRPr lang="en-US" dirty="0"/>
           </a:p>
@@ -8447,270 +8755,6 @@
     <p:extLst>
       <p:ext uri="{BB962C8B-B14F-4D97-AF65-F5344CB8AC3E}">
         <p14:creationId xmlns:p14="http://schemas.microsoft.com/office/powerpoint/2010/main" val="2131691655"/>
-      </p:ext>
-    </p:extLst>
-  </p:cSld>
-  <p:clrMapOvr>
-    <a:masterClrMapping/>
-  </p:clrMapOvr>
-</p:sld>
-</file>
-
-<file path=ppt/slides/slide19.xml><?xml version="1.0" encoding="utf-8"?>
-<p:sld xmlns:a="http://schemas.openxmlformats.org/drawingml/2006/main" xmlns:r="http://schemas.openxmlformats.org/officeDocument/2006/relationships" xmlns:p="http://schemas.openxmlformats.org/presentationml/2006/main">
-  <p:cSld>
-    <p:spTree>
-      <p:nvGrpSpPr>
-        <p:cNvPr id="1" name=""/>
-        <p:cNvGrpSpPr/>
-        <p:nvPr/>
-      </p:nvGrpSpPr>
-      <p:grpSpPr>
-        <a:xfrm>
-          <a:off x="0" y="0"/>
-          <a:ext cx="0" cy="0"/>
-          <a:chOff x="0" y="0"/>
-          <a:chExt cx="0" cy="0"/>
-        </a:xfrm>
-      </p:grpSpPr>
-      <p:sp>
-        <p:nvSpPr>
-          <p:cNvPr id="2" name="Title 1">
-            <a:extLst>
-              <a:ext uri="{FF2B5EF4-FFF2-40B4-BE49-F238E27FC236}">
-                <a16:creationId xmlns:a16="http://schemas.microsoft.com/office/drawing/2014/main" id="{08A83E15-2151-47C0-9EF1-ADA322027CCE}"/>
-              </a:ext>
-            </a:extLst>
-          </p:cNvPr>
-          <p:cNvSpPr>
-            <a:spLocks noGrp="1"/>
-          </p:cNvSpPr>
-          <p:nvPr>
-            <p:ph type="title"/>
-          </p:nvPr>
-        </p:nvSpPr>
-        <p:spPr/>
-        <p:txBody>
-          <a:bodyPr/>
-          <a:lstStyle/>
-          <a:p>
-            <a:r>
-              <a:rPr lang="en-US" dirty="0"/>
-              <a:t>Project Grading	</a:t>
-            </a:r>
-          </a:p>
-        </p:txBody>
-      </p:sp>
-      <p:sp>
-        <p:nvSpPr>
-          <p:cNvPr id="3" name="Content Placeholder 2">
-            <a:extLst>
-              <a:ext uri="{FF2B5EF4-FFF2-40B4-BE49-F238E27FC236}">
-                <a16:creationId xmlns:a16="http://schemas.microsoft.com/office/drawing/2014/main" id="{98DBC5B0-0D3B-4804-AA22-77009216687E}"/>
-              </a:ext>
-            </a:extLst>
-          </p:cNvPr>
-          <p:cNvSpPr>
-            <a:spLocks noGrp="1"/>
-          </p:cNvSpPr>
-          <p:nvPr>
-            <p:ph idx="1"/>
-          </p:nvPr>
-        </p:nvSpPr>
-        <p:spPr/>
-        <p:txBody>
-          <a:bodyPr>
-            <a:normAutofit fontScale="92500" lnSpcReduction="20000"/>
-          </a:bodyPr>
-          <a:lstStyle/>
-          <a:p>
-            <a:r>
-              <a:rPr lang="en-US" dirty="0">
-                <a:solidFill>
-                  <a:schemeClr val="accent1">
-                    <a:lumMod val="60000"/>
-                    <a:lumOff val="40000"/>
-                  </a:schemeClr>
-                </a:solidFill>
-              </a:rPr>
-              <a:t>Formulation</a:t>
-            </a:r>
-            <a:endParaRPr lang="en-US" dirty="0"/>
-          </a:p>
-          <a:p>
-            <a:pPr lvl="1"/>
-            <a:r>
-              <a:rPr lang="en-US" dirty="0"/>
-              <a:t>How well did you formulate the problem?  Was it clear?  What were you trying to achieve?</a:t>
-            </a:r>
-          </a:p>
-          <a:p>
-            <a:r>
-              <a:rPr lang="en-US" dirty="0">
-                <a:solidFill>
-                  <a:schemeClr val="accent1">
-                    <a:lumMod val="60000"/>
-                    <a:lumOff val="40000"/>
-                  </a:schemeClr>
-                </a:solidFill>
-              </a:rPr>
-              <a:t>Approach and Design</a:t>
-            </a:r>
-            <a:endParaRPr lang="en-US" dirty="0"/>
-          </a:p>
-          <a:p>
-            <a:pPr lvl="1"/>
-            <a:r>
-              <a:rPr lang="en-US" dirty="0"/>
-              <a:t>Does your approach properly solve your problem?  Is the design logical?  Is the design robust?</a:t>
-            </a:r>
-          </a:p>
-          <a:p>
-            <a:r>
-              <a:rPr lang="en-US" dirty="0">
-                <a:solidFill>
-                  <a:schemeClr val="accent1">
-                    <a:lumMod val="60000"/>
-                    <a:lumOff val="40000"/>
-                  </a:schemeClr>
-                </a:solidFill>
-              </a:rPr>
-              <a:t>Evaluation and Interpretation</a:t>
-            </a:r>
-            <a:endParaRPr lang="en-US" dirty="0"/>
-          </a:p>
-          <a:p>
-            <a:pPr lvl="1"/>
-            <a:r>
-              <a:rPr lang="en-US" dirty="0"/>
-              <a:t>How did you evaluate the approach?  Were the metrics correct?  What were the test assumptions?</a:t>
-            </a:r>
-          </a:p>
-          <a:p>
-            <a:pPr lvl="1"/>
-            <a:r>
-              <a:rPr lang="en-US" dirty="0"/>
-              <a:t>Did you test against alternative approaches?</a:t>
-            </a:r>
-          </a:p>
-          <a:p>
-            <a:r>
-              <a:rPr lang="en-US" dirty="0">
-                <a:solidFill>
-                  <a:schemeClr val="accent1">
-                    <a:lumMod val="60000"/>
-                    <a:lumOff val="40000"/>
-                  </a:schemeClr>
-                </a:solidFill>
-              </a:rPr>
-              <a:t>Implementation</a:t>
-            </a:r>
-          </a:p>
-          <a:p>
-            <a:pPr lvl="1"/>
-            <a:r>
-              <a:rPr lang="en-US" dirty="0"/>
-              <a:t>Did the software work?  Was it well-structured, commented.  How modular is it?</a:t>
-            </a:r>
-          </a:p>
-          <a:p>
-            <a:r>
-              <a:rPr lang="en-US" dirty="0">
-                <a:solidFill>
-                  <a:schemeClr val="accent1">
-                    <a:lumMod val="60000"/>
-                    <a:lumOff val="40000"/>
-                  </a:schemeClr>
-                </a:solidFill>
-              </a:rPr>
-              <a:t>Presentation</a:t>
-            </a:r>
-            <a:r>
-              <a:rPr lang="en-US" dirty="0"/>
-              <a:t>  </a:t>
-            </a:r>
-          </a:p>
-          <a:p>
-            <a:pPr lvl="1"/>
-            <a:r>
-              <a:rPr lang="en-US" dirty="0"/>
-              <a:t>Were the ideas clear?  Were all the details conveyed.  Did you highlight the main points?</a:t>
-            </a:r>
-          </a:p>
-          <a:p>
-            <a:pPr lvl="1"/>
-            <a:r>
-              <a:rPr lang="en-US" dirty="0"/>
-              <a:t>You can select a number of formats.  Whatever makes sense.  A </a:t>
-            </a:r>
-            <a:r>
-              <a:rPr lang="en-US" dirty="0" err="1"/>
-              <a:t>github</a:t>
-            </a:r>
-            <a:r>
-              <a:rPr lang="en-US" dirty="0"/>
-              <a:t> page</a:t>
-            </a:r>
-          </a:p>
-          <a:p>
-            <a:r>
-              <a:rPr lang="en-US" dirty="0">
-                <a:solidFill>
-                  <a:schemeClr val="accent1">
-                    <a:lumMod val="60000"/>
-                    <a:lumOff val="40000"/>
-                  </a:schemeClr>
-                </a:solidFill>
-              </a:rPr>
-              <a:t>Bonus</a:t>
-            </a:r>
-          </a:p>
-          <a:p>
-            <a:pPr lvl="1"/>
-            <a:r>
-              <a:rPr lang="en-US" dirty="0">
-                <a:solidFill>
-                  <a:schemeClr val="tx1"/>
-                </a:solidFill>
-              </a:rPr>
-              <a:t>Given for particularly hard / novel research</a:t>
-            </a:r>
-          </a:p>
-        </p:txBody>
-      </p:sp>
-      <p:sp>
-        <p:nvSpPr>
-          <p:cNvPr id="4" name="Slide Number Placeholder 3">
-            <a:extLst>
-              <a:ext uri="{FF2B5EF4-FFF2-40B4-BE49-F238E27FC236}">
-                <a16:creationId xmlns:a16="http://schemas.microsoft.com/office/drawing/2014/main" id="{85FA53A8-2A5E-49EE-88AA-3E008B3D21B1}"/>
-              </a:ext>
-            </a:extLst>
-          </p:cNvPr>
-          <p:cNvSpPr>
-            <a:spLocks noGrp="1"/>
-          </p:cNvSpPr>
-          <p:nvPr>
-            <p:ph type="sldNum" sz="quarter" idx="12"/>
-          </p:nvPr>
-        </p:nvSpPr>
-        <p:spPr/>
-        <p:txBody>
-          <a:bodyPr/>
-          <a:lstStyle/>
-          <a:p>
-            <a:fld id="{629637A9-119A-49DA-BD12-AAC58B377D80}" type="slidenum">
-              <a:rPr lang="en-US" smtClean="0"/>
-              <a:t>19</a:t>
-            </a:fld>
-            <a:endParaRPr lang="en-US" dirty="0"/>
-          </a:p>
-        </p:txBody>
-      </p:sp>
-    </p:spTree>
-    <p:extLst>
-      <p:ext uri="{BB962C8B-B14F-4D97-AF65-F5344CB8AC3E}">
-        <p14:creationId xmlns:p14="http://schemas.microsoft.com/office/powerpoint/2010/main" val="2682996528"/>
       </p:ext>
     </p:extLst>
   </p:cSld>
@@ -8805,7 +8849,7 @@
             <a:pPr lvl="1"/>
             <a:r>
               <a:rPr lang="en-US" dirty="0"/>
-              <a:t>Office Hours:  Mondays  3-4pm</a:t>
+              <a:t>Office Hours:  Wed  3-4pm</a:t>
             </a:r>
           </a:p>
           <a:p>
@@ -8820,7 +8864,7 @@
                 <a:ea typeface="Times New Roman" panose="02020603050405020304" pitchFamily="18" charset="0"/>
                 <a:cs typeface="Times New Roman" panose="02020603050405020304" pitchFamily="18" charset="0"/>
               </a:rPr>
-              <a:t>TBD</a:t>
+              <a:t>None</a:t>
             </a:r>
             <a:endParaRPr lang="de-DE" dirty="0"/>
           </a:p>
@@ -8828,13 +8872,13 @@
             <a:pPr lvl="1"/>
             <a:r>
               <a:rPr lang="de-DE" dirty="0"/>
-              <a:t>Ask for all questions regarding homeworks and labs</a:t>
+              <a:t>But my PhD students may help</a:t>
             </a:r>
           </a:p>
           <a:p>
             <a:r>
               <a:rPr lang="de-DE" dirty="0"/>
-              <a:t>Class time:  Tuesdays 11 to 1:30pm, 2 Metrotech Room 811</a:t>
+              <a:t>Class time:  Tuesdays 6 to 8:30, 2 Metrotech Room 810</a:t>
             </a:r>
           </a:p>
           <a:p>
@@ -8861,7 +8905,7 @@
           <a:p>
             <a:r>
               <a:rPr lang="de-DE" dirty="0"/>
-              <a:t>Online lectures from previous year available on YouTube.</a:t>
+              <a:t>Online lectures from 2020 available on YouTube.  </a:t>
             </a:r>
           </a:p>
           <a:p>
@@ -8881,7 +8925,7 @@
             <a:pPr lvl="1"/>
             <a:r>
               <a:rPr lang="de-DE" dirty="0"/>
-              <a:t>I may add / modify these, this semester</a:t>
+              <a:t>They are a bit out of date, but mostly OK</a:t>
             </a:r>
           </a:p>
         </p:txBody>
@@ -8950,6 +8994,270 @@
           <p:cNvPr id="2" name="Title 1">
             <a:extLst>
               <a:ext uri="{FF2B5EF4-FFF2-40B4-BE49-F238E27FC236}">
+                <a16:creationId xmlns:a16="http://schemas.microsoft.com/office/drawing/2014/main" id="{08A83E15-2151-47C0-9EF1-ADA322027CCE}"/>
+              </a:ext>
+            </a:extLst>
+          </p:cNvPr>
+          <p:cNvSpPr>
+            <a:spLocks noGrp="1"/>
+          </p:cNvSpPr>
+          <p:nvPr>
+            <p:ph type="title"/>
+          </p:nvPr>
+        </p:nvSpPr>
+        <p:spPr/>
+        <p:txBody>
+          <a:bodyPr/>
+          <a:lstStyle/>
+          <a:p>
+            <a:r>
+              <a:rPr lang="en-US" dirty="0"/>
+              <a:t>Project Grading	</a:t>
+            </a:r>
+          </a:p>
+        </p:txBody>
+      </p:sp>
+      <p:sp>
+        <p:nvSpPr>
+          <p:cNvPr id="3" name="Content Placeholder 2">
+            <a:extLst>
+              <a:ext uri="{FF2B5EF4-FFF2-40B4-BE49-F238E27FC236}">
+                <a16:creationId xmlns:a16="http://schemas.microsoft.com/office/drawing/2014/main" id="{98DBC5B0-0D3B-4804-AA22-77009216687E}"/>
+              </a:ext>
+            </a:extLst>
+          </p:cNvPr>
+          <p:cNvSpPr>
+            <a:spLocks noGrp="1"/>
+          </p:cNvSpPr>
+          <p:nvPr>
+            <p:ph idx="1"/>
+          </p:nvPr>
+        </p:nvSpPr>
+        <p:spPr/>
+        <p:txBody>
+          <a:bodyPr>
+            <a:normAutofit fontScale="92500" lnSpcReduction="20000"/>
+          </a:bodyPr>
+          <a:lstStyle/>
+          <a:p>
+            <a:r>
+              <a:rPr lang="en-US" dirty="0">
+                <a:solidFill>
+                  <a:schemeClr val="accent1">
+                    <a:lumMod val="60000"/>
+                    <a:lumOff val="40000"/>
+                  </a:schemeClr>
+                </a:solidFill>
+              </a:rPr>
+              <a:t>Formulation</a:t>
+            </a:r>
+            <a:endParaRPr lang="en-US" dirty="0"/>
+          </a:p>
+          <a:p>
+            <a:pPr lvl="1"/>
+            <a:r>
+              <a:rPr lang="en-US" dirty="0"/>
+              <a:t>How well did you formulate the problem?  Was it clear?  What were you trying to achieve?</a:t>
+            </a:r>
+          </a:p>
+          <a:p>
+            <a:r>
+              <a:rPr lang="en-US" dirty="0">
+                <a:solidFill>
+                  <a:schemeClr val="accent1">
+                    <a:lumMod val="60000"/>
+                    <a:lumOff val="40000"/>
+                  </a:schemeClr>
+                </a:solidFill>
+              </a:rPr>
+              <a:t>Approach and Design</a:t>
+            </a:r>
+            <a:endParaRPr lang="en-US" dirty="0"/>
+          </a:p>
+          <a:p>
+            <a:pPr lvl="1"/>
+            <a:r>
+              <a:rPr lang="en-US" dirty="0"/>
+              <a:t>Does your approach properly solve your problem?  Is the design logical?  Is the design robust?</a:t>
+            </a:r>
+          </a:p>
+          <a:p>
+            <a:r>
+              <a:rPr lang="en-US" dirty="0">
+                <a:solidFill>
+                  <a:schemeClr val="accent1">
+                    <a:lumMod val="60000"/>
+                    <a:lumOff val="40000"/>
+                  </a:schemeClr>
+                </a:solidFill>
+              </a:rPr>
+              <a:t>Evaluation and Interpretation</a:t>
+            </a:r>
+            <a:endParaRPr lang="en-US" dirty="0"/>
+          </a:p>
+          <a:p>
+            <a:pPr lvl="1"/>
+            <a:r>
+              <a:rPr lang="en-US" dirty="0"/>
+              <a:t>How did you evaluate the approach?  Were the metrics correct?  What were the test assumptions?</a:t>
+            </a:r>
+          </a:p>
+          <a:p>
+            <a:pPr lvl="1"/>
+            <a:r>
+              <a:rPr lang="en-US" dirty="0"/>
+              <a:t>Did you test against alternative approaches?</a:t>
+            </a:r>
+          </a:p>
+          <a:p>
+            <a:r>
+              <a:rPr lang="en-US" dirty="0">
+                <a:solidFill>
+                  <a:schemeClr val="accent1">
+                    <a:lumMod val="60000"/>
+                    <a:lumOff val="40000"/>
+                  </a:schemeClr>
+                </a:solidFill>
+              </a:rPr>
+              <a:t>Implementation</a:t>
+            </a:r>
+          </a:p>
+          <a:p>
+            <a:pPr lvl="1"/>
+            <a:r>
+              <a:rPr lang="en-US" dirty="0"/>
+              <a:t>Did the software work?  Was it well-structured, commented.  How modular is it?</a:t>
+            </a:r>
+          </a:p>
+          <a:p>
+            <a:r>
+              <a:rPr lang="en-US" dirty="0">
+                <a:solidFill>
+                  <a:schemeClr val="accent1">
+                    <a:lumMod val="60000"/>
+                    <a:lumOff val="40000"/>
+                  </a:schemeClr>
+                </a:solidFill>
+              </a:rPr>
+              <a:t>Presentation</a:t>
+            </a:r>
+            <a:r>
+              <a:rPr lang="en-US" dirty="0"/>
+              <a:t>  </a:t>
+            </a:r>
+          </a:p>
+          <a:p>
+            <a:pPr lvl="1"/>
+            <a:r>
+              <a:rPr lang="en-US" dirty="0"/>
+              <a:t>Were the ideas clear?  Were all the details conveyed.  Did you highlight the main points?</a:t>
+            </a:r>
+          </a:p>
+          <a:p>
+            <a:pPr lvl="1"/>
+            <a:r>
+              <a:rPr lang="en-US" dirty="0"/>
+              <a:t>You can select a number of formats.  Whatever makes sense.  A </a:t>
+            </a:r>
+            <a:r>
+              <a:rPr lang="en-US" dirty="0" err="1"/>
+              <a:t>github</a:t>
+            </a:r>
+            <a:r>
+              <a:rPr lang="en-US" dirty="0"/>
+              <a:t> page</a:t>
+            </a:r>
+          </a:p>
+          <a:p>
+            <a:r>
+              <a:rPr lang="en-US" dirty="0">
+                <a:solidFill>
+                  <a:schemeClr val="accent1">
+                    <a:lumMod val="60000"/>
+                    <a:lumOff val="40000"/>
+                  </a:schemeClr>
+                </a:solidFill>
+              </a:rPr>
+              <a:t>Bonus</a:t>
+            </a:r>
+          </a:p>
+          <a:p>
+            <a:pPr lvl="1"/>
+            <a:r>
+              <a:rPr lang="en-US" dirty="0">
+                <a:solidFill>
+                  <a:schemeClr val="tx1"/>
+                </a:solidFill>
+              </a:rPr>
+              <a:t>Given for particularly hard / novel research</a:t>
+            </a:r>
+          </a:p>
+        </p:txBody>
+      </p:sp>
+      <p:sp>
+        <p:nvSpPr>
+          <p:cNvPr id="4" name="Slide Number Placeholder 3">
+            <a:extLst>
+              <a:ext uri="{FF2B5EF4-FFF2-40B4-BE49-F238E27FC236}">
+                <a16:creationId xmlns:a16="http://schemas.microsoft.com/office/drawing/2014/main" id="{85FA53A8-2A5E-49EE-88AA-3E008B3D21B1}"/>
+              </a:ext>
+            </a:extLst>
+          </p:cNvPr>
+          <p:cNvSpPr>
+            <a:spLocks noGrp="1"/>
+          </p:cNvSpPr>
+          <p:nvPr>
+            <p:ph type="sldNum" sz="quarter" idx="12"/>
+          </p:nvPr>
+        </p:nvSpPr>
+        <p:spPr/>
+        <p:txBody>
+          <a:bodyPr/>
+          <a:lstStyle/>
+          <a:p>
+            <a:fld id="{629637A9-119A-49DA-BD12-AAC58B377D80}" type="slidenum">
+              <a:rPr lang="en-US" smtClean="0"/>
+              <a:t>20</a:t>
+            </a:fld>
+            <a:endParaRPr lang="en-US" dirty="0"/>
+          </a:p>
+        </p:txBody>
+      </p:sp>
+    </p:spTree>
+    <p:extLst>
+      <p:ext uri="{BB962C8B-B14F-4D97-AF65-F5344CB8AC3E}">
+        <p14:creationId xmlns:p14="http://schemas.microsoft.com/office/powerpoint/2010/main" val="2682996528"/>
+      </p:ext>
+    </p:extLst>
+  </p:cSld>
+  <p:clrMapOvr>
+    <a:masterClrMapping/>
+  </p:clrMapOvr>
+</p:sld>
+</file>
+
+<file path=ppt/slides/slide21.xml><?xml version="1.0" encoding="utf-8"?>
+<p:sld xmlns:a="http://schemas.openxmlformats.org/drawingml/2006/main" xmlns:r="http://schemas.openxmlformats.org/officeDocument/2006/relationships" xmlns:p="http://schemas.openxmlformats.org/presentationml/2006/main">
+  <p:cSld>
+    <p:spTree>
+      <p:nvGrpSpPr>
+        <p:cNvPr id="1" name=""/>
+        <p:cNvGrpSpPr/>
+        <p:nvPr/>
+      </p:nvGrpSpPr>
+      <p:grpSpPr>
+        <a:xfrm>
+          <a:off x="0" y="0"/>
+          <a:ext cx="0" cy="0"/>
+          <a:chOff x="0" y="0"/>
+          <a:chExt cx="0" cy="0"/>
+        </a:xfrm>
+      </p:grpSpPr>
+      <p:sp>
+        <p:nvSpPr>
+          <p:cNvPr id="2" name="Title 1">
+            <a:extLst>
+              <a:ext uri="{FF2B5EF4-FFF2-40B4-BE49-F238E27FC236}">
                 <a16:creationId xmlns:a16="http://schemas.microsoft.com/office/drawing/2014/main" id="{C9F03EB3-9B64-4C85-A225-CBF7437EB5B7}"/>
               </a:ext>
             </a:extLst>
@@ -9053,6 +9361,18 @@
           </a:p>
           <a:p>
             <a:pPr lvl="1"/>
+            <a:r>
+              <a:rPr lang="en-US" dirty="0"/>
+              <a:t>Nvidia </a:t>
+            </a:r>
+            <a:r>
+              <a:rPr lang="en-US" dirty="0" err="1"/>
+              <a:t>Sionna</a:t>
+            </a:r>
+            <a:endParaRPr lang="en-US" dirty="0"/>
+          </a:p>
+          <a:p>
+            <a:pPr lvl="1"/>
             <a:endParaRPr lang="en-US" dirty="0"/>
           </a:p>
           <a:p>
@@ -9086,7 +9406,7 @@
           <a:p>
             <a:fld id="{629637A9-119A-49DA-BD12-AAC58B377D80}" type="slidenum">
               <a:rPr lang="en-US" smtClean="0"/>
-              <a:t>20</a:t>
+              <a:t>21</a:t>
             </a:fld>
             <a:endParaRPr lang="en-US" dirty="0"/>
           </a:p>

</xml_diff>